<commit_message>
Added !GL{}, !PG{}, !CL{} parser functions. Added localStorage.
</commit_message>
<xml_diff>
--- a/fig_raw.pptx
+++ b/fig_raw.pptx
@@ -5,10 +5,11 @@
     <p:sldMasterId id="2147483648" r:id="rId1"/>
   </p:sldMasterIdLst>
   <p:notesMasterIdLst>
-    <p:notesMasterId r:id="rId3"/>
+    <p:notesMasterId r:id="rId4"/>
   </p:notesMasterIdLst>
   <p:sldIdLst>
     <p:sldId id="256" r:id="rId2"/>
+    <p:sldId id="257" r:id="rId3"/>
   </p:sldIdLst>
   <p:sldSz cx="12192000" cy="6858000"/>
   <p:notesSz cx="6858000" cy="9144000"/>
@@ -192,7 +193,7 @@
           <a:p>
             <a:fld id="{3F769DC9-0A60-BE45-94BD-461E4F03983E}" type="datetimeFigureOut">
               <a:rPr kumimoji="1" lang="ja-JP" altLang="en-US" smtClean="0"/>
-              <a:t>2018/1/8</a:t>
+              <a:t>18/01/16</a:t>
             </a:fld>
             <a:endParaRPr kumimoji="1" lang="ja-JP" altLang="en-US"/>
           </a:p>
@@ -536,6 +537,10 @@
           <a:bodyPr/>
           <a:lstStyle/>
           <a:p>
+            <a:r>
+              <a:rPr kumimoji="1" lang="en-US" altLang="ja-JP" dirty="0" smtClean="0"/>
+              <a:t>c1</a:t>
+            </a:r>
             <a:endParaRPr kumimoji="1" lang="ja-JP" altLang="en-US" dirty="0"/>
           </a:p>
         </p:txBody>
@@ -707,7 +712,7 @@
           <a:p>
             <a:fld id="{6EEC4090-F0F3-D240-9AC5-5712C2D6CEAC}" type="datetimeFigureOut">
               <a:rPr kumimoji="1" lang="ja-JP" altLang="en-US" smtClean="0"/>
-              <a:t>2018/1/8</a:t>
+              <a:t>18/01/16</a:t>
             </a:fld>
             <a:endParaRPr kumimoji="1" lang="ja-JP" altLang="en-US"/>
           </a:p>
@@ -909,7 +914,7 @@
           <a:p>
             <a:fld id="{6EEC4090-F0F3-D240-9AC5-5712C2D6CEAC}" type="datetimeFigureOut">
               <a:rPr kumimoji="1" lang="ja-JP" altLang="en-US" smtClean="0"/>
-              <a:t>2018/1/8</a:t>
+              <a:t>18/01/16</a:t>
             </a:fld>
             <a:endParaRPr kumimoji="1" lang="ja-JP" altLang="en-US"/>
           </a:p>
@@ -1121,7 +1126,7 @@
           <a:p>
             <a:fld id="{6EEC4090-F0F3-D240-9AC5-5712C2D6CEAC}" type="datetimeFigureOut">
               <a:rPr kumimoji="1" lang="ja-JP" altLang="en-US" smtClean="0"/>
-              <a:t>2018/1/8</a:t>
+              <a:t>18/01/16</a:t>
             </a:fld>
             <a:endParaRPr kumimoji="1" lang="ja-JP" altLang="en-US"/>
           </a:p>
@@ -1323,7 +1328,7 @@
           <a:p>
             <a:fld id="{6EEC4090-F0F3-D240-9AC5-5712C2D6CEAC}" type="datetimeFigureOut">
               <a:rPr kumimoji="1" lang="ja-JP" altLang="en-US" smtClean="0"/>
-              <a:t>2018/1/8</a:t>
+              <a:t>18/01/16</a:t>
             </a:fld>
             <a:endParaRPr kumimoji="1" lang="ja-JP" altLang="en-US"/>
           </a:p>
@@ -1569,7 +1574,7 @@
           <a:p>
             <a:fld id="{6EEC4090-F0F3-D240-9AC5-5712C2D6CEAC}" type="datetimeFigureOut">
               <a:rPr kumimoji="1" lang="ja-JP" altLang="en-US" smtClean="0"/>
-              <a:t>2018/1/8</a:t>
+              <a:t>18/01/16</a:t>
             </a:fld>
             <a:endParaRPr kumimoji="1" lang="ja-JP" altLang="en-US"/>
           </a:p>
@@ -1865,7 +1870,7 @@
           <a:p>
             <a:fld id="{6EEC4090-F0F3-D240-9AC5-5712C2D6CEAC}" type="datetimeFigureOut">
               <a:rPr kumimoji="1" lang="ja-JP" altLang="en-US" smtClean="0"/>
-              <a:t>2018/1/8</a:t>
+              <a:t>18/01/16</a:t>
             </a:fld>
             <a:endParaRPr kumimoji="1" lang="ja-JP" altLang="en-US"/>
           </a:p>
@@ -2296,7 +2301,7 @@
           <a:p>
             <a:fld id="{6EEC4090-F0F3-D240-9AC5-5712C2D6CEAC}" type="datetimeFigureOut">
               <a:rPr kumimoji="1" lang="ja-JP" altLang="en-US" smtClean="0"/>
-              <a:t>2018/1/8</a:t>
+              <a:t>18/01/16</a:t>
             </a:fld>
             <a:endParaRPr kumimoji="1" lang="ja-JP" altLang="en-US"/>
           </a:p>
@@ -2414,7 +2419,7 @@
           <a:p>
             <a:fld id="{6EEC4090-F0F3-D240-9AC5-5712C2D6CEAC}" type="datetimeFigureOut">
               <a:rPr kumimoji="1" lang="ja-JP" altLang="en-US" smtClean="0"/>
-              <a:t>2018/1/8</a:t>
+              <a:t>18/01/16</a:t>
             </a:fld>
             <a:endParaRPr kumimoji="1" lang="ja-JP" altLang="en-US"/>
           </a:p>
@@ -2509,7 +2514,7 @@
           <a:p>
             <a:fld id="{6EEC4090-F0F3-D240-9AC5-5712C2D6CEAC}" type="datetimeFigureOut">
               <a:rPr kumimoji="1" lang="ja-JP" altLang="en-US" smtClean="0"/>
-              <a:t>2018/1/8</a:t>
+              <a:t>18/01/16</a:t>
             </a:fld>
             <a:endParaRPr kumimoji="1" lang="ja-JP" altLang="en-US"/>
           </a:p>
@@ -2818,7 +2823,7 @@
           <a:p>
             <a:fld id="{6EEC4090-F0F3-D240-9AC5-5712C2D6CEAC}" type="datetimeFigureOut">
               <a:rPr kumimoji="1" lang="ja-JP" altLang="en-US" smtClean="0"/>
-              <a:t>2018/1/8</a:t>
+              <a:t>18/01/16</a:t>
             </a:fld>
             <a:endParaRPr kumimoji="1" lang="ja-JP" altLang="en-US"/>
           </a:p>
@@ -3071,7 +3076,7 @@
           <a:p>
             <a:fld id="{6EEC4090-F0F3-D240-9AC5-5712C2D6CEAC}" type="datetimeFigureOut">
               <a:rPr kumimoji="1" lang="ja-JP" altLang="en-US" smtClean="0"/>
-              <a:t>2018/1/8</a:t>
+              <a:t>18/01/16</a:t>
             </a:fld>
             <a:endParaRPr kumimoji="1" lang="ja-JP" altLang="en-US"/>
           </a:p>
@@ -3316,7 +3321,7 @@
           <a:p>
             <a:fld id="{6EEC4090-F0F3-D240-9AC5-5712C2D6CEAC}" type="datetimeFigureOut">
               <a:rPr kumimoji="1" lang="ja-JP" altLang="en-US" smtClean="0"/>
-              <a:t>2018/1/8</a:t>
+              <a:t>18/01/16</a:t>
             </a:fld>
             <a:endParaRPr kumimoji="1" lang="ja-JP" altLang="en-US"/>
           </a:p>
@@ -3721,54 +3726,6 @@
           <a:chExt cx="0" cy="0"/>
         </a:xfrm>
       </p:grpSpPr>
-      <p:pic>
-        <p:nvPicPr>
-          <p:cNvPr id="4" name="図 3"/>
-          <p:cNvPicPr>
-            <a:picLocks noChangeAspect="1"/>
-          </p:cNvPicPr>
-          <p:nvPr/>
-        </p:nvPicPr>
-        <p:blipFill>
-          <a:blip r:embed="rId3"/>
-          <a:stretch>
-            <a:fillRect/>
-          </a:stretch>
-        </p:blipFill>
-        <p:spPr>
-          <a:xfrm>
-            <a:off x="324493" y="392896"/>
-            <a:ext cx="1079500" cy="863600"/>
-          </a:xfrm>
-          <a:prstGeom prst="rect">
-            <a:avLst/>
-          </a:prstGeom>
-        </p:spPr>
-      </p:pic>
-      <p:pic>
-        <p:nvPicPr>
-          <p:cNvPr id="5" name="図 4"/>
-          <p:cNvPicPr>
-            <a:picLocks noChangeAspect="1"/>
-          </p:cNvPicPr>
-          <p:nvPr/>
-        </p:nvPicPr>
-        <p:blipFill>
-          <a:blip r:embed="rId3"/>
-          <a:stretch>
-            <a:fillRect/>
-          </a:stretch>
-        </p:blipFill>
-        <p:spPr>
-          <a:xfrm>
-            <a:off x="2317268" y="392896"/>
-            <a:ext cx="1079500" cy="863600"/>
-          </a:xfrm>
-          <a:prstGeom prst="rect">
-            <a:avLst/>
-          </a:prstGeom>
-        </p:spPr>
-      </p:pic>
       <p:grpSp>
         <p:nvGrpSpPr>
           <p:cNvPr id="16" name="図形グループ 15"/>
@@ -3940,7 +3897,7 @@
           </p:nvCxnSpPr>
           <p:spPr>
             <a:xfrm rot="16200000">
-              <a:off x="1884075" y="2424715"/>
+              <a:off x="1884075" y="2419877"/>
               <a:ext cx="0" cy="180000"/>
             </a:xfrm>
             <a:prstGeom prst="line">
@@ -3975,7 +3932,7 @@
           </p:nvCxnSpPr>
           <p:spPr>
             <a:xfrm rot="16200000">
-              <a:off x="1884075" y="2948279"/>
+              <a:off x="1884075" y="2933765"/>
               <a:ext cx="0" cy="180000"/>
             </a:xfrm>
             <a:prstGeom prst="line">
@@ -4047,9 +4004,9 @@
         <p:grpSpPr>
           <a:xfrm>
             <a:off x="3136071" y="2408989"/>
-            <a:ext cx="1356835" cy="880933"/>
+            <a:ext cx="1635954" cy="880933"/>
             <a:chOff x="1166445" y="2337855"/>
-            <a:chExt cx="1356835" cy="880933"/>
+            <a:chExt cx="1635954" cy="880933"/>
           </a:xfrm>
         </p:grpSpPr>
         <p:sp>
@@ -4137,7 +4094,7 @@
           <p:spPr>
             <a:xfrm>
               <a:off x="1895650" y="2849456"/>
-              <a:ext cx="625033" cy="369332"/>
+              <a:ext cx="906749" cy="369332"/>
             </a:xfrm>
             <a:prstGeom prst="rect">
               <a:avLst/>
@@ -4167,7 +4124,18 @@
                   <a:ea typeface="Helvetica Neue" charset="0"/>
                   <a:cs typeface="Helvetica Neue" charset="0"/>
                 </a:rPr>
-                <a:t>P</a:t>
+                <a:t>PO</a:t>
+              </a:r>
+              <a:r>
+                <a:rPr lang="en-US" altLang="ja-JP" sz="1400" dirty="0" smtClean="0">
+                  <a:solidFill>
+                    <a:srgbClr val="FF0000"/>
+                  </a:solidFill>
+                  <a:latin typeface="Helvetica Neue" charset="0"/>
+                  <a:ea typeface="Helvetica Neue" charset="0"/>
+                  <a:cs typeface="Helvetica Neue" charset="0"/>
+                </a:rPr>
+                <a:t>3</a:t>
               </a:r>
               <a:endParaRPr lang="ja-JP" altLang="en-US" dirty="0">
                 <a:solidFill>
@@ -4223,7 +4191,7 @@
           </p:nvCxnSpPr>
           <p:spPr>
             <a:xfrm rot="16200000">
-              <a:off x="1884075" y="2424715"/>
+              <a:off x="1884075" y="2421510"/>
               <a:ext cx="0" cy="180000"/>
             </a:xfrm>
             <a:prstGeom prst="line">
@@ -4258,7 +4226,7 @@
           </p:nvCxnSpPr>
           <p:spPr>
             <a:xfrm rot="16200000">
-              <a:off x="1884075" y="2948279"/>
+              <a:off x="1884075" y="2933407"/>
               <a:ext cx="0" cy="180000"/>
             </a:xfrm>
             <a:prstGeom prst="line">
@@ -4323,28 +4291,656 @@
       </p:grpSp>
       <p:grpSp>
         <p:nvGrpSpPr>
-          <p:cNvPr id="25" name="図形グループ 24"/>
+          <p:cNvPr id="33" name="図形グループ 32"/>
+          <p:cNvGrpSpPr/>
+          <p:nvPr/>
+        </p:nvGrpSpPr>
+        <p:grpSpPr>
+          <a:xfrm>
+            <a:off x="6950838" y="2407163"/>
+            <a:ext cx="2428321" cy="880933"/>
+            <a:chOff x="579395" y="2337855"/>
+            <a:chExt cx="2428321" cy="880933"/>
+          </a:xfrm>
+        </p:grpSpPr>
+        <p:sp>
+          <p:nvSpPr>
+            <p:cNvPr id="34" name="テキスト ボックス 33"/>
+            <p:cNvSpPr txBox="1"/>
+            <p:nvPr/>
+          </p:nvSpPr>
+          <p:spPr>
+            <a:xfrm>
+              <a:off x="1898247" y="2337855"/>
+              <a:ext cx="1109469" cy="369332"/>
+            </a:xfrm>
+            <a:prstGeom prst="rect">
+              <a:avLst/>
+            </a:prstGeom>
+            <a:noFill/>
+          </p:spPr>
+          <p:txBody>
+            <a:bodyPr wrap="square" rtlCol="0">
+              <a:spAutoFit/>
+            </a:bodyPr>
+            <a:lstStyle/>
+            <a:p>
+              <a:r>
+                <a:rPr lang="en-US" altLang="ja-JP" smtClean="0">
+                  <a:latin typeface="Helvetica Neue" charset="0"/>
+                  <a:ea typeface="Helvetica Neue" charset="0"/>
+                  <a:cs typeface="Helvetica Neue" charset="0"/>
+                </a:rPr>
+                <a:t>OCO-</a:t>
+              </a:r>
+              <a:r>
+                <a:rPr lang="en-US" altLang="ja-JP" b="1" smtClean="0">
+                  <a:latin typeface="Helvetica Neue" charset="0"/>
+                  <a:ea typeface="Helvetica Neue" charset="0"/>
+                  <a:cs typeface="Helvetica Neue" charset="0"/>
+                </a:rPr>
+                <a:t>R1</a:t>
+              </a:r>
+              <a:endParaRPr lang="ja-JP" altLang="en-US" b="1" dirty="0">
+                <a:latin typeface="Helvetica Neue" charset="0"/>
+                <a:ea typeface="Helvetica Neue" charset="0"/>
+                <a:cs typeface="Helvetica Neue" charset="0"/>
+              </a:endParaRPr>
+            </a:p>
+          </p:txBody>
+        </p:sp>
+        <p:sp>
+          <p:nvSpPr>
+            <p:cNvPr id="35" name="テキスト ボックス 34"/>
+            <p:cNvSpPr txBox="1"/>
+            <p:nvPr/>
+          </p:nvSpPr>
+          <p:spPr>
+            <a:xfrm>
+              <a:off x="579395" y="2593232"/>
+              <a:ext cx="1112067" cy="369332"/>
+            </a:xfrm>
+            <a:prstGeom prst="rect">
+              <a:avLst/>
+            </a:prstGeom>
+            <a:noFill/>
+          </p:spPr>
+          <p:txBody>
+            <a:bodyPr wrap="square" rtlCol="0">
+              <a:spAutoFit/>
+            </a:bodyPr>
+            <a:lstStyle/>
+            <a:p>
+              <a:pPr algn="r"/>
+              <a:r>
+                <a:rPr lang="en-US" altLang="ja-JP" b="1" dirty="0" smtClean="0">
+                  <a:latin typeface="Helvetica Neue" charset="0"/>
+                  <a:ea typeface="Helvetica Neue" charset="0"/>
+                  <a:cs typeface="Helvetica Neue" charset="0"/>
+                </a:rPr>
+                <a:t>R2</a:t>
+              </a:r>
+              <a:r>
+                <a:rPr lang="en-US" altLang="ja-JP" dirty="0" smtClean="0">
+                  <a:latin typeface="Helvetica Neue" charset="0"/>
+                  <a:ea typeface="Helvetica Neue" charset="0"/>
+                  <a:cs typeface="Helvetica Neue" charset="0"/>
+                </a:rPr>
+                <a:t>-COO</a:t>
+              </a:r>
+              <a:endParaRPr lang="ja-JP" altLang="en-US" dirty="0">
+                <a:latin typeface="Helvetica Neue" charset="0"/>
+                <a:ea typeface="Helvetica Neue" charset="0"/>
+                <a:cs typeface="Helvetica Neue" charset="0"/>
+              </a:endParaRPr>
+            </a:p>
+          </p:txBody>
+        </p:sp>
+        <p:sp>
+          <p:nvSpPr>
+            <p:cNvPr id="36" name="テキスト ボックス 35"/>
+            <p:cNvSpPr txBox="1"/>
+            <p:nvPr/>
+          </p:nvSpPr>
+          <p:spPr>
+            <a:xfrm>
+              <a:off x="1895649" y="2849456"/>
+              <a:ext cx="876907" cy="369332"/>
+            </a:xfrm>
+            <a:prstGeom prst="rect">
+              <a:avLst/>
+            </a:prstGeom>
+            <a:noFill/>
+          </p:spPr>
+          <p:txBody>
+            <a:bodyPr wrap="square" rtlCol="0">
+              <a:spAutoFit/>
+            </a:bodyPr>
+            <a:lstStyle/>
+            <a:p>
+              <a:r>
+                <a:rPr lang="en-US" altLang="ja-JP" smtClean="0">
+                  <a:latin typeface="Helvetica Neue" charset="0"/>
+                  <a:ea typeface="Helvetica Neue" charset="0"/>
+                  <a:cs typeface="Helvetica Neue" charset="0"/>
+                </a:rPr>
+                <a:t>O-</a:t>
+              </a:r>
+              <a:r>
+                <a:rPr lang="en-US" altLang="ja-JP" smtClean="0">
+                  <a:solidFill>
+                    <a:srgbClr val="FF0000"/>
+                  </a:solidFill>
+                  <a:latin typeface="Helvetica Neue" charset="0"/>
+                  <a:ea typeface="Helvetica Neue" charset="0"/>
+                  <a:cs typeface="Helvetica Neue" charset="0"/>
+                </a:rPr>
+                <a:t>PO</a:t>
+              </a:r>
+              <a:r>
+                <a:rPr lang="en-US" altLang="ja-JP" sz="1400" smtClean="0">
+                  <a:solidFill>
+                    <a:srgbClr val="FF0000"/>
+                  </a:solidFill>
+                  <a:latin typeface="Helvetica Neue" charset="0"/>
+                  <a:ea typeface="Helvetica Neue" charset="0"/>
+                  <a:cs typeface="Helvetica Neue" charset="0"/>
+                </a:rPr>
+                <a:t>3</a:t>
+              </a:r>
+              <a:endParaRPr lang="ja-JP" altLang="en-US" dirty="0">
+                <a:solidFill>
+                  <a:srgbClr val="FF0000"/>
+                </a:solidFill>
+                <a:latin typeface="Helvetica Neue" charset="0"/>
+                <a:ea typeface="Helvetica Neue" charset="0"/>
+                <a:cs typeface="Helvetica Neue" charset="0"/>
+              </a:endParaRPr>
+            </a:p>
+          </p:txBody>
+        </p:sp>
+        <p:cxnSp>
+          <p:nvCxnSpPr>
+            <p:cNvPr id="37" name="直線コネクタ 36"/>
+            <p:cNvCxnSpPr/>
+            <p:nvPr/>
+          </p:nvCxnSpPr>
+          <p:spPr>
+            <a:xfrm>
+              <a:off x="1794076" y="2498279"/>
+              <a:ext cx="0" cy="540000"/>
+            </a:xfrm>
+            <a:prstGeom prst="line">
+              <a:avLst/>
+            </a:prstGeom>
+            <a:ln w="28575">
+              <a:solidFill>
+                <a:schemeClr val="tx1"/>
+              </a:solidFill>
+            </a:ln>
+          </p:spPr>
+          <p:style>
+            <a:lnRef idx="1">
+              <a:schemeClr val="accent1"/>
+            </a:lnRef>
+            <a:fillRef idx="0">
+              <a:schemeClr val="accent1"/>
+            </a:fillRef>
+            <a:effectRef idx="0">
+              <a:schemeClr val="accent1"/>
+            </a:effectRef>
+            <a:fontRef idx="minor">
+              <a:schemeClr val="tx1"/>
+            </a:fontRef>
+          </p:style>
+        </p:cxnSp>
+        <p:cxnSp>
+          <p:nvCxnSpPr>
+            <p:cNvPr id="38" name="直線コネクタ 37"/>
+            <p:cNvCxnSpPr/>
+            <p:nvPr/>
+          </p:nvCxnSpPr>
+          <p:spPr>
+            <a:xfrm rot="16200000">
+              <a:off x="1884075" y="2421540"/>
+              <a:ext cx="0" cy="180000"/>
+            </a:xfrm>
+            <a:prstGeom prst="line">
+              <a:avLst/>
+            </a:prstGeom>
+            <a:ln w="28575">
+              <a:solidFill>
+                <a:schemeClr val="tx1"/>
+              </a:solidFill>
+            </a:ln>
+          </p:spPr>
+          <p:style>
+            <a:lnRef idx="1">
+              <a:schemeClr val="accent1"/>
+            </a:lnRef>
+            <a:fillRef idx="0">
+              <a:schemeClr val="accent1"/>
+            </a:fillRef>
+            <a:effectRef idx="0">
+              <a:schemeClr val="accent1"/>
+            </a:effectRef>
+            <a:fontRef idx="minor">
+              <a:schemeClr val="tx1"/>
+            </a:fontRef>
+          </p:style>
+        </p:cxnSp>
+        <p:cxnSp>
+          <p:nvCxnSpPr>
+            <p:cNvPr id="39" name="直線コネクタ 38"/>
+            <p:cNvCxnSpPr/>
+            <p:nvPr/>
+          </p:nvCxnSpPr>
+          <p:spPr>
+            <a:xfrm rot="16200000">
+              <a:off x="1884075" y="2935579"/>
+              <a:ext cx="0" cy="180000"/>
+            </a:xfrm>
+            <a:prstGeom prst="line">
+              <a:avLst/>
+            </a:prstGeom>
+            <a:ln w="28575">
+              <a:solidFill>
+                <a:schemeClr val="tx1"/>
+              </a:solidFill>
+            </a:ln>
+          </p:spPr>
+          <p:style>
+            <a:lnRef idx="1">
+              <a:schemeClr val="accent1"/>
+            </a:lnRef>
+            <a:fillRef idx="0">
+              <a:schemeClr val="accent1"/>
+            </a:fillRef>
+            <a:effectRef idx="0">
+              <a:schemeClr val="accent1"/>
+            </a:effectRef>
+            <a:fontRef idx="minor">
+              <a:schemeClr val="tx1"/>
+            </a:fontRef>
+          </p:style>
+        </p:cxnSp>
+        <p:cxnSp>
+          <p:nvCxnSpPr>
+            <p:cNvPr id="40" name="直線コネクタ 39"/>
+            <p:cNvCxnSpPr/>
+            <p:nvPr/>
+          </p:nvCxnSpPr>
+          <p:spPr>
+            <a:xfrm rot="16200000">
+              <a:off x="1704074" y="2686497"/>
+              <a:ext cx="0" cy="180000"/>
+            </a:xfrm>
+            <a:prstGeom prst="line">
+              <a:avLst/>
+            </a:prstGeom>
+            <a:ln w="28575">
+              <a:solidFill>
+                <a:schemeClr val="tx1"/>
+              </a:solidFill>
+            </a:ln>
+          </p:spPr>
+          <p:style>
+            <a:lnRef idx="1">
+              <a:schemeClr val="accent1"/>
+            </a:lnRef>
+            <a:fillRef idx="0">
+              <a:schemeClr val="accent1"/>
+            </a:fillRef>
+            <a:effectRef idx="0">
+              <a:schemeClr val="accent1"/>
+            </a:effectRef>
+            <a:fontRef idx="minor">
+              <a:schemeClr val="tx1"/>
+            </a:fontRef>
+          </p:style>
+        </p:cxnSp>
+      </p:grpSp>
+      <p:grpSp>
+        <p:nvGrpSpPr>
+          <p:cNvPr id="46" name="図形グループ 45"/>
           <p:cNvGrpSpPr/>
           <p:nvPr/>
         </p:nvGrpSpPr>
         <p:grpSpPr>
           <a:xfrm>
             <a:off x="5001526" y="2337855"/>
-            <a:ext cx="1943881" cy="880933"/>
-            <a:chOff x="1166445" y="2337855"/>
-            <a:chExt cx="1943881" cy="880933"/>
+            <a:ext cx="1847740" cy="880933"/>
+            <a:chOff x="5001526" y="2337855"/>
+            <a:chExt cx="1847740" cy="880933"/>
+          </a:xfrm>
+        </p:grpSpPr>
+        <p:grpSp>
+          <p:nvGrpSpPr>
+            <p:cNvPr id="25" name="図形グループ 24"/>
+            <p:cNvGrpSpPr/>
+            <p:nvPr/>
+          </p:nvGrpSpPr>
+          <p:grpSpPr>
+            <a:xfrm>
+              <a:off x="5001526" y="2337855"/>
+              <a:ext cx="1847740" cy="880933"/>
+              <a:chOff x="1166445" y="2337855"/>
+              <a:chExt cx="1847740" cy="880933"/>
+            </a:xfrm>
+          </p:grpSpPr>
+          <p:sp>
+            <p:nvSpPr>
+              <p:cNvPr id="26" name="テキスト ボックス 25"/>
+              <p:cNvSpPr txBox="1"/>
+              <p:nvPr/>
+            </p:nvSpPr>
+            <p:spPr>
+              <a:xfrm>
+                <a:off x="1898248" y="2337855"/>
+                <a:ext cx="1115937" cy="369332"/>
+              </a:xfrm>
+              <a:prstGeom prst="rect">
+                <a:avLst/>
+              </a:prstGeom>
+              <a:noFill/>
+            </p:spPr>
+            <p:txBody>
+              <a:bodyPr wrap="square" rtlCol="0">
+                <a:spAutoFit/>
+              </a:bodyPr>
+              <a:lstStyle/>
+              <a:p>
+                <a:r>
+                  <a:rPr lang="en-US" altLang="ja-JP" dirty="0" smtClean="0">
+                    <a:latin typeface="Helvetica Neue" charset="0"/>
+                    <a:ea typeface="Helvetica Neue" charset="0"/>
+                    <a:cs typeface="Helvetica Neue" charset="0"/>
+                  </a:rPr>
+                  <a:t>OCO-</a:t>
+                </a:r>
+                <a:r>
+                  <a:rPr lang="en-US" altLang="ja-JP" b="1" dirty="0" smtClean="0">
+                    <a:latin typeface="Helvetica Neue" charset="0"/>
+                    <a:ea typeface="Helvetica Neue" charset="0"/>
+                    <a:cs typeface="Helvetica Neue" charset="0"/>
+                  </a:rPr>
+                  <a:t>R1</a:t>
+                </a:r>
+                <a:endParaRPr lang="ja-JP" altLang="en-US" b="1" dirty="0">
+                  <a:latin typeface="Helvetica Neue" charset="0"/>
+                  <a:ea typeface="Helvetica Neue" charset="0"/>
+                  <a:cs typeface="Helvetica Neue" charset="0"/>
+                </a:endParaRPr>
+              </a:p>
+            </p:txBody>
+          </p:sp>
+          <p:sp>
+            <p:nvSpPr>
+              <p:cNvPr id="27" name="テキスト ボックス 26"/>
+              <p:cNvSpPr txBox="1"/>
+              <p:nvPr/>
+            </p:nvSpPr>
+            <p:spPr>
+              <a:xfrm>
+                <a:off x="1166445" y="2593232"/>
+                <a:ext cx="625033" cy="369332"/>
+              </a:xfrm>
+              <a:prstGeom prst="rect">
+                <a:avLst/>
+              </a:prstGeom>
+              <a:noFill/>
+            </p:spPr>
+            <p:txBody>
+              <a:bodyPr wrap="square" rtlCol="0">
+                <a:spAutoFit/>
+              </a:bodyPr>
+              <a:lstStyle/>
+              <a:p>
+                <a:r>
+                  <a:rPr lang="en-US" altLang="ja-JP" dirty="0" smtClean="0">
+                    <a:latin typeface="Helvetica Neue" charset="0"/>
+                    <a:ea typeface="Helvetica Neue" charset="0"/>
+                    <a:cs typeface="Helvetica Neue" charset="0"/>
+                  </a:rPr>
+                  <a:t>HO</a:t>
+                </a:r>
+                <a:endParaRPr lang="ja-JP" altLang="en-US" dirty="0">
+                  <a:latin typeface="Helvetica Neue" charset="0"/>
+                  <a:ea typeface="Helvetica Neue" charset="0"/>
+                  <a:cs typeface="Helvetica Neue" charset="0"/>
+                </a:endParaRPr>
+              </a:p>
+            </p:txBody>
+          </p:sp>
+          <p:sp>
+            <p:nvSpPr>
+              <p:cNvPr id="28" name="テキスト ボックス 27"/>
+              <p:cNvSpPr txBox="1"/>
+              <p:nvPr/>
+            </p:nvSpPr>
+            <p:spPr>
+              <a:xfrm>
+                <a:off x="1895650" y="2849456"/>
+                <a:ext cx="930507" cy="369332"/>
+              </a:xfrm>
+              <a:prstGeom prst="rect">
+                <a:avLst/>
+              </a:prstGeom>
+              <a:noFill/>
+            </p:spPr>
+            <p:txBody>
+              <a:bodyPr wrap="square" rtlCol="0">
+                <a:spAutoFit/>
+              </a:bodyPr>
+              <a:lstStyle/>
+              <a:p>
+                <a:r>
+                  <a:rPr lang="en-US" altLang="ja-JP" dirty="0" smtClean="0">
+                    <a:latin typeface="Helvetica Neue" charset="0"/>
+                    <a:ea typeface="Helvetica Neue" charset="0"/>
+                    <a:cs typeface="Helvetica Neue" charset="0"/>
+                  </a:rPr>
+                  <a:t>O-</a:t>
+                </a:r>
+                <a:r>
+                  <a:rPr lang="en-US" altLang="ja-JP" dirty="0" smtClean="0">
+                    <a:solidFill>
+                      <a:srgbClr val="FF0000"/>
+                    </a:solidFill>
+                    <a:latin typeface="Helvetica Neue" charset="0"/>
+                    <a:ea typeface="Helvetica Neue" charset="0"/>
+                    <a:cs typeface="Helvetica Neue" charset="0"/>
+                  </a:rPr>
+                  <a:t>PO</a:t>
+                </a:r>
+                <a:r>
+                  <a:rPr lang="en-US" altLang="ja-JP" sz="1400" dirty="0" smtClean="0">
+                    <a:solidFill>
+                      <a:srgbClr val="FF0000"/>
+                    </a:solidFill>
+                    <a:latin typeface="Helvetica Neue" charset="0"/>
+                    <a:ea typeface="Helvetica Neue" charset="0"/>
+                    <a:cs typeface="Helvetica Neue" charset="0"/>
+                  </a:rPr>
+                  <a:t>3</a:t>
+                </a:r>
+                <a:endParaRPr lang="ja-JP" altLang="en-US" dirty="0">
+                  <a:solidFill>
+                    <a:srgbClr val="FF0000"/>
+                  </a:solidFill>
+                  <a:latin typeface="Helvetica Neue" charset="0"/>
+                  <a:ea typeface="Helvetica Neue" charset="0"/>
+                  <a:cs typeface="Helvetica Neue" charset="0"/>
+                </a:endParaRPr>
+              </a:p>
+            </p:txBody>
+          </p:sp>
+        </p:grpSp>
+        <p:cxnSp>
+          <p:nvCxnSpPr>
+            <p:cNvPr id="41" name="直線コネクタ 40"/>
+            <p:cNvCxnSpPr/>
+            <p:nvPr/>
+          </p:nvCxnSpPr>
+          <p:spPr>
+            <a:xfrm>
+              <a:off x="5626559" y="2508314"/>
+              <a:ext cx="0" cy="540000"/>
+            </a:xfrm>
+            <a:prstGeom prst="line">
+              <a:avLst/>
+            </a:prstGeom>
+            <a:ln w="28575">
+              <a:solidFill>
+                <a:schemeClr val="tx1"/>
+              </a:solidFill>
+            </a:ln>
+          </p:spPr>
+          <p:style>
+            <a:lnRef idx="1">
+              <a:schemeClr val="accent1"/>
+            </a:lnRef>
+            <a:fillRef idx="0">
+              <a:schemeClr val="accent1"/>
+            </a:fillRef>
+            <a:effectRef idx="0">
+              <a:schemeClr val="accent1"/>
+            </a:effectRef>
+            <a:fontRef idx="minor">
+              <a:schemeClr val="tx1"/>
+            </a:fontRef>
+          </p:style>
+        </p:cxnSp>
+        <p:cxnSp>
+          <p:nvCxnSpPr>
+            <p:cNvPr id="42" name="直線コネクタ 41"/>
+            <p:cNvCxnSpPr/>
+            <p:nvPr/>
+          </p:nvCxnSpPr>
+          <p:spPr>
+            <a:xfrm rot="16200000">
+              <a:off x="5716558" y="2429403"/>
+              <a:ext cx="0" cy="180000"/>
+            </a:xfrm>
+            <a:prstGeom prst="line">
+              <a:avLst/>
+            </a:prstGeom>
+            <a:ln w="28575">
+              <a:solidFill>
+                <a:schemeClr val="tx1"/>
+              </a:solidFill>
+            </a:ln>
+          </p:spPr>
+          <p:style>
+            <a:lnRef idx="1">
+              <a:schemeClr val="accent1"/>
+            </a:lnRef>
+            <a:fillRef idx="0">
+              <a:schemeClr val="accent1"/>
+            </a:fillRef>
+            <a:effectRef idx="0">
+              <a:schemeClr val="accent1"/>
+            </a:effectRef>
+            <a:fontRef idx="minor">
+              <a:schemeClr val="tx1"/>
+            </a:fontRef>
+          </p:style>
+        </p:cxnSp>
+        <p:cxnSp>
+          <p:nvCxnSpPr>
+            <p:cNvPr id="44" name="直線コネクタ 43"/>
+            <p:cNvCxnSpPr/>
+            <p:nvPr/>
+          </p:nvCxnSpPr>
+          <p:spPr>
+            <a:xfrm rot="16200000">
+              <a:off x="5536557" y="2696532"/>
+              <a:ext cx="0" cy="180000"/>
+            </a:xfrm>
+            <a:prstGeom prst="line">
+              <a:avLst/>
+            </a:prstGeom>
+            <a:ln w="28575">
+              <a:solidFill>
+                <a:schemeClr val="tx1"/>
+              </a:solidFill>
+            </a:ln>
+          </p:spPr>
+          <p:style>
+            <a:lnRef idx="1">
+              <a:schemeClr val="accent1"/>
+            </a:lnRef>
+            <a:fillRef idx="0">
+              <a:schemeClr val="accent1"/>
+            </a:fillRef>
+            <a:effectRef idx="0">
+              <a:schemeClr val="accent1"/>
+            </a:effectRef>
+            <a:fontRef idx="minor">
+              <a:schemeClr val="tx1"/>
+            </a:fontRef>
+          </p:style>
+        </p:cxnSp>
+        <p:cxnSp>
+          <p:nvCxnSpPr>
+            <p:cNvPr id="45" name="直線コネクタ 44"/>
+            <p:cNvCxnSpPr/>
+            <p:nvPr/>
+          </p:nvCxnSpPr>
+          <p:spPr>
+            <a:xfrm rot="16200000">
+              <a:off x="5710639" y="2944067"/>
+              <a:ext cx="0" cy="180000"/>
+            </a:xfrm>
+            <a:prstGeom prst="line">
+              <a:avLst/>
+            </a:prstGeom>
+            <a:ln w="28575">
+              <a:solidFill>
+                <a:schemeClr val="tx1"/>
+              </a:solidFill>
+            </a:ln>
+          </p:spPr>
+          <p:style>
+            <a:lnRef idx="1">
+              <a:schemeClr val="accent1"/>
+            </a:lnRef>
+            <a:fillRef idx="0">
+              <a:schemeClr val="accent1"/>
+            </a:fillRef>
+            <a:effectRef idx="0">
+              <a:schemeClr val="accent1"/>
+            </a:effectRef>
+            <a:fontRef idx="minor">
+              <a:schemeClr val="tx1"/>
+            </a:fontRef>
+          </p:style>
+        </p:cxnSp>
+      </p:grpSp>
+      <p:grpSp>
+        <p:nvGrpSpPr>
+          <p:cNvPr id="47" name="図形グループ 46"/>
+          <p:cNvGrpSpPr/>
+          <p:nvPr/>
+        </p:nvGrpSpPr>
+        <p:grpSpPr>
+          <a:xfrm>
+            <a:off x="9814525" y="2483388"/>
+            <a:ext cx="2428321" cy="880933"/>
+            <a:chOff x="579395" y="2337855"/>
+            <a:chExt cx="2428321" cy="880933"/>
           </a:xfrm>
         </p:grpSpPr>
         <p:sp>
           <p:nvSpPr>
-            <p:cNvPr id="26" name="テキスト ボックス 25"/>
+            <p:cNvPr id="48" name="テキスト ボックス 47"/>
             <p:cNvSpPr txBox="1"/>
             <p:nvPr/>
           </p:nvSpPr>
           <p:spPr>
             <a:xfrm>
               <a:off x="1898247" y="2337855"/>
-              <a:ext cx="1212079" cy="369332"/>
+              <a:ext cx="1109469" cy="369332"/>
             </a:xfrm>
             <a:prstGeom prst="rect">
               <a:avLst/>
@@ -4363,7 +4959,7 @@
                   <a:ea typeface="Helvetica Neue" charset="0"/>
                   <a:cs typeface="Helvetica Neue" charset="0"/>
                 </a:rPr>
-                <a:t>O-CO-</a:t>
+                <a:t>OCO-</a:t>
               </a:r>
               <a:r>
                 <a:rPr lang="en-US" altLang="ja-JP" b="1" dirty="0" smtClean="0">
@@ -4383,14 +4979,61 @@
         </p:sp>
         <p:sp>
           <p:nvSpPr>
-            <p:cNvPr id="27" name="テキスト ボックス 26"/>
+            <p:cNvPr id="49" name="テキスト ボックス 48"/>
             <p:cNvSpPr txBox="1"/>
             <p:nvPr/>
           </p:nvSpPr>
           <p:spPr>
             <a:xfrm>
-              <a:off x="1166445" y="2593232"/>
-              <a:ext cx="625033" cy="369332"/>
+              <a:off x="579395" y="2593232"/>
+              <a:ext cx="1112067" cy="369332"/>
+            </a:xfrm>
+            <a:prstGeom prst="rect">
+              <a:avLst/>
+            </a:prstGeom>
+            <a:noFill/>
+          </p:spPr>
+          <p:txBody>
+            <a:bodyPr wrap="square" rtlCol="0">
+              <a:spAutoFit/>
+            </a:bodyPr>
+            <a:lstStyle/>
+            <a:p>
+              <a:pPr algn="r"/>
+              <a:r>
+                <a:rPr lang="en-US" altLang="ja-JP" b="1" dirty="0" smtClean="0">
+                  <a:latin typeface="Helvetica Neue" charset="0"/>
+                  <a:ea typeface="Helvetica Neue" charset="0"/>
+                  <a:cs typeface="Helvetica Neue" charset="0"/>
+                </a:rPr>
+                <a:t>R2</a:t>
+              </a:r>
+              <a:r>
+                <a:rPr lang="en-US" altLang="ja-JP" dirty="0" smtClean="0">
+                  <a:latin typeface="Helvetica Neue" charset="0"/>
+                  <a:ea typeface="Helvetica Neue" charset="0"/>
+                  <a:cs typeface="Helvetica Neue" charset="0"/>
+                </a:rPr>
+                <a:t>-COO</a:t>
+              </a:r>
+              <a:endParaRPr lang="ja-JP" altLang="en-US" dirty="0">
+                <a:latin typeface="Helvetica Neue" charset="0"/>
+                <a:ea typeface="Helvetica Neue" charset="0"/>
+                <a:cs typeface="Helvetica Neue" charset="0"/>
+              </a:endParaRPr>
+            </a:p>
+          </p:txBody>
+        </p:sp>
+        <p:sp>
+          <p:nvSpPr>
+            <p:cNvPr id="50" name="テキスト ボックス 49"/>
+            <p:cNvSpPr txBox="1"/>
+            <p:nvPr/>
+          </p:nvSpPr>
+          <p:spPr>
+            <a:xfrm>
+              <a:off x="1895649" y="2849456"/>
+              <a:ext cx="876907" cy="369332"/>
             </a:xfrm>
             <a:prstGeom prst="rect">
               <a:avLst/>
@@ -4409,56 +5052,7 @@
                   <a:ea typeface="Helvetica Neue" charset="0"/>
                   <a:cs typeface="Helvetica Neue" charset="0"/>
                 </a:rPr>
-                <a:t>HO</a:t>
-              </a:r>
-              <a:endParaRPr lang="ja-JP" altLang="en-US" dirty="0">
-                <a:latin typeface="Helvetica Neue" charset="0"/>
-                <a:ea typeface="Helvetica Neue" charset="0"/>
-                <a:cs typeface="Helvetica Neue" charset="0"/>
-              </a:endParaRPr>
-            </a:p>
-          </p:txBody>
-        </p:sp>
-        <p:sp>
-          <p:nvSpPr>
-            <p:cNvPr id="28" name="テキスト ボックス 27"/>
-            <p:cNvSpPr txBox="1"/>
-            <p:nvPr/>
-          </p:nvSpPr>
-          <p:spPr>
-            <a:xfrm>
-              <a:off x="1895650" y="2849456"/>
-              <a:ext cx="625033" cy="369332"/>
-            </a:xfrm>
-            <a:prstGeom prst="rect">
-              <a:avLst/>
-            </a:prstGeom>
-            <a:noFill/>
-          </p:spPr>
-          <p:txBody>
-            <a:bodyPr wrap="square" rtlCol="0">
-              <a:spAutoFit/>
-            </a:bodyPr>
-            <a:lstStyle/>
-            <a:p>
-              <a:r>
-                <a:rPr lang="en-US" altLang="ja-JP" dirty="0" smtClean="0">
-                  <a:latin typeface="Helvetica Neue" charset="0"/>
-                  <a:ea typeface="Helvetica Neue" charset="0"/>
-                  <a:cs typeface="Helvetica Neue" charset="0"/>
-                </a:rPr>
-                <a:t>O-</a:t>
-              </a:r>
-              <a:r>
-                <a:rPr lang="en-US" altLang="ja-JP" dirty="0" smtClean="0">
-                  <a:solidFill>
-                    <a:srgbClr val="FF0000"/>
-                  </a:solidFill>
-                  <a:latin typeface="Helvetica Neue" charset="0"/>
-                  <a:ea typeface="Helvetica Neue" charset="0"/>
-                  <a:cs typeface="Helvetica Neue" charset="0"/>
-                </a:rPr>
-                <a:t>P</a:t>
+                <a:t>OH</a:t>
               </a:r>
               <a:endParaRPr lang="ja-JP" altLang="en-US" dirty="0">
                 <a:solidFill>
@@ -4473,7 +5067,7 @@
         </p:sp>
         <p:cxnSp>
           <p:nvCxnSpPr>
-            <p:cNvPr id="29" name="直線コネクタ 28"/>
+            <p:cNvPr id="51" name="直線コネクタ 50"/>
             <p:cNvCxnSpPr/>
             <p:nvPr/>
           </p:nvCxnSpPr>
@@ -4508,13 +5102,13 @@
         </p:cxnSp>
         <p:cxnSp>
           <p:nvCxnSpPr>
-            <p:cNvPr id="30" name="直線コネクタ 29"/>
+            <p:cNvPr id="52" name="直線コネクタ 51"/>
             <p:cNvCxnSpPr/>
             <p:nvPr/>
           </p:nvCxnSpPr>
           <p:spPr>
             <a:xfrm rot="16200000">
-              <a:off x="1884075" y="2424715"/>
+              <a:off x="1884075" y="2421540"/>
               <a:ext cx="0" cy="180000"/>
             </a:xfrm>
             <a:prstGeom prst="line">
@@ -4543,13 +5137,13 @@
         </p:cxnSp>
         <p:cxnSp>
           <p:nvCxnSpPr>
-            <p:cNvPr id="31" name="直線コネクタ 30"/>
+            <p:cNvPr id="53" name="直線コネクタ 52"/>
             <p:cNvCxnSpPr/>
             <p:nvPr/>
           </p:nvCxnSpPr>
           <p:spPr>
             <a:xfrm rot="16200000">
-              <a:off x="1884075" y="2948279"/>
+              <a:off x="1884075" y="2935579"/>
               <a:ext cx="0" cy="180000"/>
             </a:xfrm>
             <a:prstGeom prst="line">
@@ -4578,7 +5172,7 @@
         </p:cxnSp>
         <p:cxnSp>
           <p:nvCxnSpPr>
-            <p:cNvPr id="32" name="直線コネクタ 31"/>
+            <p:cNvPr id="54" name="直線コネクタ 53"/>
             <p:cNvCxnSpPr/>
             <p:nvPr/>
           </p:nvCxnSpPr>
@@ -4612,6 +5206,1644 @@
           </p:style>
         </p:cxnSp>
       </p:grpSp>
+      <p:grpSp>
+        <p:nvGrpSpPr>
+          <p:cNvPr id="55" name="図形グループ 54"/>
+          <p:cNvGrpSpPr/>
+          <p:nvPr/>
+        </p:nvGrpSpPr>
+        <p:grpSpPr>
+          <a:xfrm>
+            <a:off x="577317" y="4636553"/>
+            <a:ext cx="3183787" cy="880933"/>
+            <a:chOff x="579395" y="2337855"/>
+            <a:chExt cx="3183787" cy="880933"/>
+          </a:xfrm>
+        </p:grpSpPr>
+        <p:sp>
+          <p:nvSpPr>
+            <p:cNvPr id="56" name="テキスト ボックス 55"/>
+            <p:cNvSpPr txBox="1"/>
+            <p:nvPr/>
+          </p:nvSpPr>
+          <p:spPr>
+            <a:xfrm>
+              <a:off x="1898247" y="2337855"/>
+              <a:ext cx="1109469" cy="369332"/>
+            </a:xfrm>
+            <a:prstGeom prst="rect">
+              <a:avLst/>
+            </a:prstGeom>
+            <a:noFill/>
+          </p:spPr>
+          <p:txBody>
+            <a:bodyPr wrap="square" rtlCol="0">
+              <a:spAutoFit/>
+            </a:bodyPr>
+            <a:lstStyle/>
+            <a:p>
+              <a:r>
+                <a:rPr lang="en-US" altLang="ja-JP" dirty="0" smtClean="0">
+                  <a:latin typeface="Helvetica Neue" charset="0"/>
+                  <a:ea typeface="Helvetica Neue" charset="0"/>
+                  <a:cs typeface="Helvetica Neue" charset="0"/>
+                </a:rPr>
+                <a:t>OCO-</a:t>
+              </a:r>
+              <a:r>
+                <a:rPr lang="en-US" altLang="ja-JP" b="1" dirty="0" smtClean="0">
+                  <a:latin typeface="Helvetica Neue" charset="0"/>
+                  <a:ea typeface="Helvetica Neue" charset="0"/>
+                  <a:cs typeface="Helvetica Neue" charset="0"/>
+                </a:rPr>
+                <a:t>R1</a:t>
+              </a:r>
+              <a:endParaRPr lang="ja-JP" altLang="en-US" b="1" dirty="0">
+                <a:latin typeface="Helvetica Neue" charset="0"/>
+                <a:ea typeface="Helvetica Neue" charset="0"/>
+                <a:cs typeface="Helvetica Neue" charset="0"/>
+              </a:endParaRPr>
+            </a:p>
+          </p:txBody>
+        </p:sp>
+        <p:sp>
+          <p:nvSpPr>
+            <p:cNvPr id="57" name="テキスト ボックス 56"/>
+            <p:cNvSpPr txBox="1"/>
+            <p:nvPr/>
+          </p:nvSpPr>
+          <p:spPr>
+            <a:xfrm>
+              <a:off x="579395" y="2593232"/>
+              <a:ext cx="1112067" cy="369332"/>
+            </a:xfrm>
+            <a:prstGeom prst="rect">
+              <a:avLst/>
+            </a:prstGeom>
+            <a:noFill/>
+          </p:spPr>
+          <p:txBody>
+            <a:bodyPr wrap="square" rtlCol="0">
+              <a:spAutoFit/>
+            </a:bodyPr>
+            <a:lstStyle/>
+            <a:p>
+              <a:pPr algn="r"/>
+              <a:r>
+                <a:rPr lang="en-US" altLang="ja-JP" b="1" dirty="0" smtClean="0">
+                  <a:latin typeface="Helvetica Neue" charset="0"/>
+                  <a:ea typeface="Helvetica Neue" charset="0"/>
+                  <a:cs typeface="Helvetica Neue" charset="0"/>
+                </a:rPr>
+                <a:t>R2</a:t>
+              </a:r>
+              <a:r>
+                <a:rPr lang="en-US" altLang="ja-JP" dirty="0" smtClean="0">
+                  <a:latin typeface="Helvetica Neue" charset="0"/>
+                  <a:ea typeface="Helvetica Neue" charset="0"/>
+                  <a:cs typeface="Helvetica Neue" charset="0"/>
+                </a:rPr>
+                <a:t>-COO</a:t>
+              </a:r>
+              <a:endParaRPr lang="ja-JP" altLang="en-US" dirty="0">
+                <a:latin typeface="Helvetica Neue" charset="0"/>
+                <a:ea typeface="Helvetica Neue" charset="0"/>
+                <a:cs typeface="Helvetica Neue" charset="0"/>
+              </a:endParaRPr>
+            </a:p>
+          </p:txBody>
+        </p:sp>
+        <p:sp>
+          <p:nvSpPr>
+            <p:cNvPr id="58" name="テキスト ボックス 57"/>
+            <p:cNvSpPr txBox="1"/>
+            <p:nvPr/>
+          </p:nvSpPr>
+          <p:spPr>
+            <a:xfrm>
+              <a:off x="1895649" y="2849456"/>
+              <a:ext cx="1867533" cy="369332"/>
+            </a:xfrm>
+            <a:prstGeom prst="rect">
+              <a:avLst/>
+            </a:prstGeom>
+            <a:noFill/>
+          </p:spPr>
+          <p:txBody>
+            <a:bodyPr wrap="square" rtlCol="0">
+              <a:spAutoFit/>
+            </a:bodyPr>
+            <a:lstStyle/>
+            <a:p>
+              <a:r>
+                <a:rPr lang="en-US" altLang="ja-JP" dirty="0" smtClean="0">
+                  <a:latin typeface="Helvetica Neue" charset="0"/>
+                  <a:ea typeface="Helvetica Neue" charset="0"/>
+                  <a:cs typeface="Helvetica Neue" charset="0"/>
+                </a:rPr>
+                <a:t>O-PO</a:t>
+              </a:r>
+              <a:r>
+                <a:rPr lang="en-US" altLang="ja-JP" sz="1400" dirty="0" smtClean="0">
+                  <a:latin typeface="Helvetica Neue" charset="0"/>
+                  <a:ea typeface="Helvetica Neue" charset="0"/>
+                  <a:cs typeface="Helvetica Neue" charset="0"/>
+                </a:rPr>
+                <a:t>2</a:t>
+              </a:r>
+              <a:r>
+                <a:rPr lang="en-US" altLang="ja-JP" dirty="0" smtClean="0">
+                  <a:latin typeface="Helvetica Neue" charset="0"/>
+                  <a:ea typeface="Helvetica Neue" charset="0"/>
+                  <a:cs typeface="Helvetica Neue" charset="0"/>
+                </a:rPr>
+                <a:t>-O-CMP</a:t>
+              </a:r>
+              <a:endParaRPr lang="ja-JP" altLang="en-US" dirty="0">
+                <a:solidFill>
+                  <a:srgbClr val="FF0000"/>
+                </a:solidFill>
+                <a:latin typeface="Helvetica Neue" charset="0"/>
+                <a:ea typeface="Helvetica Neue" charset="0"/>
+                <a:cs typeface="Helvetica Neue" charset="0"/>
+              </a:endParaRPr>
+            </a:p>
+          </p:txBody>
+        </p:sp>
+        <p:cxnSp>
+          <p:nvCxnSpPr>
+            <p:cNvPr id="59" name="直線コネクタ 58"/>
+            <p:cNvCxnSpPr/>
+            <p:nvPr/>
+          </p:nvCxnSpPr>
+          <p:spPr>
+            <a:xfrm>
+              <a:off x="1794076" y="2498279"/>
+              <a:ext cx="0" cy="540000"/>
+            </a:xfrm>
+            <a:prstGeom prst="line">
+              <a:avLst/>
+            </a:prstGeom>
+            <a:ln w="28575">
+              <a:solidFill>
+                <a:schemeClr val="tx1"/>
+              </a:solidFill>
+            </a:ln>
+          </p:spPr>
+          <p:style>
+            <a:lnRef idx="1">
+              <a:schemeClr val="accent1"/>
+            </a:lnRef>
+            <a:fillRef idx="0">
+              <a:schemeClr val="accent1"/>
+            </a:fillRef>
+            <a:effectRef idx="0">
+              <a:schemeClr val="accent1"/>
+            </a:effectRef>
+            <a:fontRef idx="minor">
+              <a:schemeClr val="tx1"/>
+            </a:fontRef>
+          </p:style>
+        </p:cxnSp>
+        <p:cxnSp>
+          <p:nvCxnSpPr>
+            <p:cNvPr id="60" name="直線コネクタ 59"/>
+            <p:cNvCxnSpPr/>
+            <p:nvPr/>
+          </p:nvCxnSpPr>
+          <p:spPr>
+            <a:xfrm rot="16200000">
+              <a:off x="1884075" y="2421540"/>
+              <a:ext cx="0" cy="180000"/>
+            </a:xfrm>
+            <a:prstGeom prst="line">
+              <a:avLst/>
+            </a:prstGeom>
+            <a:ln w="28575">
+              <a:solidFill>
+                <a:schemeClr val="tx1"/>
+              </a:solidFill>
+            </a:ln>
+          </p:spPr>
+          <p:style>
+            <a:lnRef idx="1">
+              <a:schemeClr val="accent1"/>
+            </a:lnRef>
+            <a:fillRef idx="0">
+              <a:schemeClr val="accent1"/>
+            </a:fillRef>
+            <a:effectRef idx="0">
+              <a:schemeClr val="accent1"/>
+            </a:effectRef>
+            <a:fontRef idx="minor">
+              <a:schemeClr val="tx1"/>
+            </a:fontRef>
+          </p:style>
+        </p:cxnSp>
+        <p:cxnSp>
+          <p:nvCxnSpPr>
+            <p:cNvPr id="61" name="直線コネクタ 60"/>
+            <p:cNvCxnSpPr/>
+            <p:nvPr/>
+          </p:nvCxnSpPr>
+          <p:spPr>
+            <a:xfrm rot="16200000">
+              <a:off x="1884075" y="2935579"/>
+              <a:ext cx="0" cy="180000"/>
+            </a:xfrm>
+            <a:prstGeom prst="line">
+              <a:avLst/>
+            </a:prstGeom>
+            <a:ln w="28575">
+              <a:solidFill>
+                <a:schemeClr val="tx1"/>
+              </a:solidFill>
+            </a:ln>
+          </p:spPr>
+          <p:style>
+            <a:lnRef idx="1">
+              <a:schemeClr val="accent1"/>
+            </a:lnRef>
+            <a:fillRef idx="0">
+              <a:schemeClr val="accent1"/>
+            </a:fillRef>
+            <a:effectRef idx="0">
+              <a:schemeClr val="accent1"/>
+            </a:effectRef>
+            <a:fontRef idx="minor">
+              <a:schemeClr val="tx1"/>
+            </a:fontRef>
+          </p:style>
+        </p:cxnSp>
+        <p:cxnSp>
+          <p:nvCxnSpPr>
+            <p:cNvPr id="62" name="直線コネクタ 61"/>
+            <p:cNvCxnSpPr/>
+            <p:nvPr/>
+          </p:nvCxnSpPr>
+          <p:spPr>
+            <a:xfrm rot="16200000">
+              <a:off x="1704074" y="2686497"/>
+              <a:ext cx="0" cy="180000"/>
+            </a:xfrm>
+            <a:prstGeom prst="line">
+              <a:avLst/>
+            </a:prstGeom>
+            <a:ln w="28575">
+              <a:solidFill>
+                <a:schemeClr val="tx1"/>
+              </a:solidFill>
+            </a:ln>
+          </p:spPr>
+          <p:style>
+            <a:lnRef idx="1">
+              <a:schemeClr val="accent1"/>
+            </a:lnRef>
+            <a:fillRef idx="0">
+              <a:schemeClr val="accent1"/>
+            </a:fillRef>
+            <a:effectRef idx="0">
+              <a:schemeClr val="accent1"/>
+            </a:effectRef>
+            <a:fontRef idx="minor">
+              <a:schemeClr val="tx1"/>
+            </a:fontRef>
+          </p:style>
+        </p:cxnSp>
+      </p:grpSp>
+      <p:grpSp>
+        <p:nvGrpSpPr>
+          <p:cNvPr id="72" name="図形グループ 71"/>
+          <p:cNvGrpSpPr/>
+          <p:nvPr/>
+        </p:nvGrpSpPr>
+        <p:grpSpPr>
+          <a:xfrm>
+            <a:off x="4123566" y="4318837"/>
+            <a:ext cx="3701692" cy="2009843"/>
+            <a:chOff x="4123566" y="4318837"/>
+            <a:chExt cx="3701692" cy="2009843"/>
+          </a:xfrm>
+        </p:grpSpPr>
+        <p:pic>
+          <p:nvPicPr>
+            <p:cNvPr id="63" name="図 62"/>
+            <p:cNvPicPr>
+              <a:picLocks noChangeAspect="1"/>
+            </p:cNvPicPr>
+            <p:nvPr/>
+          </p:nvPicPr>
+          <p:blipFill rotWithShape="1">
+            <a:blip r:embed="rId3"/>
+            <a:srcRect l="58471" t="36734" r="1539" b="7807"/>
+            <a:stretch/>
+          </p:blipFill>
+          <p:spPr>
+            <a:xfrm>
+              <a:off x="6062219" y="4432767"/>
+              <a:ext cx="1763039" cy="1895913"/>
+            </a:xfrm>
+            <a:prstGeom prst="rect">
+              <a:avLst/>
+            </a:prstGeom>
+          </p:spPr>
+        </p:pic>
+        <p:grpSp>
+          <p:nvGrpSpPr>
+            <p:cNvPr id="64" name="図形グループ 63"/>
+            <p:cNvGrpSpPr/>
+            <p:nvPr/>
+          </p:nvGrpSpPr>
+          <p:grpSpPr>
+            <a:xfrm>
+              <a:off x="4123566" y="4318837"/>
+              <a:ext cx="2428321" cy="819378"/>
+              <a:chOff x="579395" y="2337855"/>
+              <a:chExt cx="2428321" cy="819378"/>
+            </a:xfrm>
+          </p:grpSpPr>
+          <p:sp>
+            <p:nvSpPr>
+              <p:cNvPr id="65" name="テキスト ボックス 64"/>
+              <p:cNvSpPr txBox="1"/>
+              <p:nvPr/>
+            </p:nvSpPr>
+            <p:spPr>
+              <a:xfrm>
+                <a:off x="1898247" y="2337855"/>
+                <a:ext cx="1109469" cy="307777"/>
+              </a:xfrm>
+              <a:prstGeom prst="rect">
+                <a:avLst/>
+              </a:prstGeom>
+              <a:noFill/>
+            </p:spPr>
+            <p:txBody>
+              <a:bodyPr wrap="square" rtlCol="0">
+                <a:spAutoFit/>
+              </a:bodyPr>
+              <a:lstStyle/>
+              <a:p>
+                <a:r>
+                  <a:rPr lang="en-US" altLang="ja-JP" sz="1400" smtClean="0">
+                    <a:latin typeface="Helvetica Neue" charset="0"/>
+                    <a:ea typeface="Helvetica Neue" charset="0"/>
+                    <a:cs typeface="Helvetica Neue" charset="0"/>
+                  </a:rPr>
+                  <a:t>OCO-</a:t>
+                </a:r>
+                <a:r>
+                  <a:rPr lang="en-US" altLang="ja-JP" sz="1400" b="1" smtClean="0">
+                    <a:latin typeface="Helvetica Neue" charset="0"/>
+                    <a:ea typeface="Helvetica Neue" charset="0"/>
+                    <a:cs typeface="Helvetica Neue" charset="0"/>
+                  </a:rPr>
+                  <a:t>R1</a:t>
+                </a:r>
+                <a:endParaRPr lang="ja-JP" altLang="en-US" sz="1400" b="1" dirty="0">
+                  <a:latin typeface="Helvetica Neue" charset="0"/>
+                  <a:ea typeface="Helvetica Neue" charset="0"/>
+                  <a:cs typeface="Helvetica Neue" charset="0"/>
+                </a:endParaRPr>
+              </a:p>
+            </p:txBody>
+          </p:sp>
+          <p:sp>
+            <p:nvSpPr>
+              <p:cNvPr id="66" name="テキスト ボックス 65"/>
+              <p:cNvSpPr txBox="1"/>
+              <p:nvPr/>
+            </p:nvSpPr>
+            <p:spPr>
+              <a:xfrm>
+                <a:off x="579395" y="2593232"/>
+                <a:ext cx="1112067" cy="307777"/>
+              </a:xfrm>
+              <a:prstGeom prst="rect">
+                <a:avLst/>
+              </a:prstGeom>
+              <a:noFill/>
+            </p:spPr>
+            <p:txBody>
+              <a:bodyPr wrap="square" rtlCol="0">
+                <a:spAutoFit/>
+              </a:bodyPr>
+              <a:lstStyle/>
+              <a:p>
+                <a:pPr algn="r"/>
+                <a:r>
+                  <a:rPr lang="en-US" altLang="ja-JP" sz="1400" b="1" dirty="0" smtClean="0">
+                    <a:latin typeface="Helvetica Neue" charset="0"/>
+                    <a:ea typeface="Helvetica Neue" charset="0"/>
+                    <a:cs typeface="Helvetica Neue" charset="0"/>
+                  </a:rPr>
+                  <a:t>R2</a:t>
+                </a:r>
+                <a:r>
+                  <a:rPr lang="en-US" altLang="ja-JP" sz="1400" dirty="0" smtClean="0">
+                    <a:latin typeface="Helvetica Neue" charset="0"/>
+                    <a:ea typeface="Helvetica Neue" charset="0"/>
+                    <a:cs typeface="Helvetica Neue" charset="0"/>
+                  </a:rPr>
+                  <a:t>-COO</a:t>
+                </a:r>
+                <a:endParaRPr lang="ja-JP" altLang="en-US" sz="1400" dirty="0">
+                  <a:latin typeface="Helvetica Neue" charset="0"/>
+                  <a:ea typeface="Helvetica Neue" charset="0"/>
+                  <a:cs typeface="Helvetica Neue" charset="0"/>
+                </a:endParaRPr>
+              </a:p>
+            </p:txBody>
+          </p:sp>
+          <p:sp>
+            <p:nvSpPr>
+              <p:cNvPr id="67" name="テキスト ボックス 66"/>
+              <p:cNvSpPr txBox="1"/>
+              <p:nvPr/>
+            </p:nvSpPr>
+            <p:spPr>
+              <a:xfrm>
+                <a:off x="1895650" y="2849456"/>
+                <a:ext cx="734838" cy="307777"/>
+              </a:xfrm>
+              <a:prstGeom prst="rect">
+                <a:avLst/>
+              </a:prstGeom>
+              <a:noFill/>
+            </p:spPr>
+            <p:txBody>
+              <a:bodyPr wrap="square" rtlCol="0">
+                <a:spAutoFit/>
+              </a:bodyPr>
+              <a:lstStyle/>
+              <a:p>
+                <a:r>
+                  <a:rPr lang="en-US" altLang="ja-JP" sz="1400" dirty="0" smtClean="0">
+                    <a:latin typeface="Helvetica Neue" charset="0"/>
+                    <a:ea typeface="Helvetica Neue" charset="0"/>
+                    <a:cs typeface="Helvetica Neue" charset="0"/>
+                  </a:rPr>
+                  <a:t>O-PO</a:t>
+                </a:r>
+                <a:r>
+                  <a:rPr lang="en-US" altLang="ja-JP" sz="1100" dirty="0" smtClean="0">
+                    <a:latin typeface="Helvetica Neue" charset="0"/>
+                    <a:ea typeface="Helvetica Neue" charset="0"/>
+                    <a:cs typeface="Helvetica Neue" charset="0"/>
+                  </a:rPr>
+                  <a:t>2</a:t>
+                </a:r>
+                <a:endParaRPr lang="ja-JP" altLang="en-US" sz="1400" dirty="0">
+                  <a:solidFill>
+                    <a:srgbClr val="FF0000"/>
+                  </a:solidFill>
+                  <a:latin typeface="Helvetica Neue" charset="0"/>
+                  <a:ea typeface="Helvetica Neue" charset="0"/>
+                  <a:cs typeface="Helvetica Neue" charset="0"/>
+                </a:endParaRPr>
+              </a:p>
+            </p:txBody>
+          </p:sp>
+          <p:cxnSp>
+            <p:nvCxnSpPr>
+              <p:cNvPr id="68" name="直線コネクタ 67"/>
+              <p:cNvCxnSpPr/>
+              <p:nvPr/>
+            </p:nvCxnSpPr>
+            <p:spPr>
+              <a:xfrm>
+                <a:off x="1794076" y="2498279"/>
+                <a:ext cx="0" cy="540000"/>
+              </a:xfrm>
+              <a:prstGeom prst="line">
+                <a:avLst/>
+              </a:prstGeom>
+              <a:ln w="28575">
+                <a:solidFill>
+                  <a:schemeClr val="tx1"/>
+                </a:solidFill>
+              </a:ln>
+            </p:spPr>
+            <p:style>
+              <a:lnRef idx="1">
+                <a:schemeClr val="accent1"/>
+              </a:lnRef>
+              <a:fillRef idx="0">
+                <a:schemeClr val="accent1"/>
+              </a:fillRef>
+              <a:effectRef idx="0">
+                <a:schemeClr val="accent1"/>
+              </a:effectRef>
+              <a:fontRef idx="minor">
+                <a:schemeClr val="tx1"/>
+              </a:fontRef>
+            </p:style>
+          </p:cxnSp>
+          <p:cxnSp>
+            <p:nvCxnSpPr>
+              <p:cNvPr id="69" name="直線コネクタ 68"/>
+              <p:cNvCxnSpPr/>
+              <p:nvPr/>
+            </p:nvCxnSpPr>
+            <p:spPr>
+              <a:xfrm rot="16200000">
+                <a:off x="1884075" y="2421540"/>
+                <a:ext cx="0" cy="180000"/>
+              </a:xfrm>
+              <a:prstGeom prst="line">
+                <a:avLst/>
+              </a:prstGeom>
+              <a:ln w="28575">
+                <a:solidFill>
+                  <a:schemeClr val="tx1"/>
+                </a:solidFill>
+              </a:ln>
+            </p:spPr>
+            <p:style>
+              <a:lnRef idx="1">
+                <a:schemeClr val="accent1"/>
+              </a:lnRef>
+              <a:fillRef idx="0">
+                <a:schemeClr val="accent1"/>
+              </a:fillRef>
+              <a:effectRef idx="0">
+                <a:schemeClr val="accent1"/>
+              </a:effectRef>
+              <a:fontRef idx="minor">
+                <a:schemeClr val="tx1"/>
+              </a:fontRef>
+            </p:style>
+          </p:cxnSp>
+          <p:cxnSp>
+            <p:nvCxnSpPr>
+              <p:cNvPr id="70" name="直線コネクタ 69"/>
+              <p:cNvCxnSpPr/>
+              <p:nvPr/>
+            </p:nvCxnSpPr>
+            <p:spPr>
+              <a:xfrm rot="16200000">
+                <a:off x="1884075" y="2935579"/>
+                <a:ext cx="0" cy="180000"/>
+              </a:xfrm>
+              <a:prstGeom prst="line">
+                <a:avLst/>
+              </a:prstGeom>
+              <a:ln w="28575">
+                <a:solidFill>
+                  <a:schemeClr val="tx1"/>
+                </a:solidFill>
+              </a:ln>
+            </p:spPr>
+            <p:style>
+              <a:lnRef idx="1">
+                <a:schemeClr val="accent1"/>
+              </a:lnRef>
+              <a:fillRef idx="0">
+                <a:schemeClr val="accent1"/>
+              </a:fillRef>
+              <a:effectRef idx="0">
+                <a:schemeClr val="accent1"/>
+              </a:effectRef>
+              <a:fontRef idx="minor">
+                <a:schemeClr val="tx1"/>
+              </a:fontRef>
+            </p:style>
+          </p:cxnSp>
+          <p:cxnSp>
+            <p:nvCxnSpPr>
+              <p:cNvPr id="71" name="直線コネクタ 70"/>
+              <p:cNvCxnSpPr/>
+              <p:nvPr/>
+            </p:nvCxnSpPr>
+            <p:spPr>
+              <a:xfrm rot="16200000">
+                <a:off x="1704074" y="2686497"/>
+                <a:ext cx="0" cy="180000"/>
+              </a:xfrm>
+              <a:prstGeom prst="line">
+                <a:avLst/>
+              </a:prstGeom>
+              <a:ln w="28575">
+                <a:solidFill>
+                  <a:schemeClr val="tx1"/>
+                </a:solidFill>
+              </a:ln>
+            </p:spPr>
+            <p:style>
+              <a:lnRef idx="1">
+                <a:schemeClr val="accent1"/>
+              </a:lnRef>
+              <a:fillRef idx="0">
+                <a:schemeClr val="accent1"/>
+              </a:fillRef>
+              <a:effectRef idx="0">
+                <a:schemeClr val="accent1"/>
+              </a:effectRef>
+              <a:fontRef idx="minor">
+                <a:schemeClr val="tx1"/>
+              </a:fontRef>
+            </p:style>
+          </p:cxnSp>
+        </p:grpSp>
+      </p:grpSp>
+      <p:sp>
+        <p:nvSpPr>
+          <p:cNvPr id="73" name="正方形/長方形 72"/>
+          <p:cNvSpPr/>
+          <p:nvPr/>
+        </p:nvSpPr>
+        <p:spPr>
+          <a:xfrm>
+            <a:off x="1047433" y="1883354"/>
+            <a:ext cx="431528" cy="369332"/>
+          </a:xfrm>
+          <a:prstGeom prst="rect">
+            <a:avLst/>
+          </a:prstGeom>
+        </p:spPr>
+        <p:txBody>
+          <a:bodyPr wrap="none">
+            <a:spAutoFit/>
+          </a:bodyPr>
+          <a:lstStyle/>
+          <a:p>
+            <a:r>
+              <a:rPr lang="en-US" altLang="ja-JP"/>
+              <a:t>c1</a:t>
+            </a:r>
+            <a:endParaRPr lang="ja-JP" altLang="en-US" dirty="0"/>
+          </a:p>
+        </p:txBody>
+      </p:sp>
+      <p:sp>
+        <p:nvSpPr>
+          <p:cNvPr id="74" name="正方形/長方形 73"/>
+          <p:cNvSpPr/>
+          <p:nvPr/>
+        </p:nvSpPr>
+        <p:spPr>
+          <a:xfrm>
+            <a:off x="3242172" y="1883354"/>
+            <a:ext cx="431528" cy="369332"/>
+          </a:xfrm>
+          <a:prstGeom prst="rect">
+            <a:avLst/>
+          </a:prstGeom>
+        </p:spPr>
+        <p:txBody>
+          <a:bodyPr wrap="none">
+            <a:spAutoFit/>
+          </a:bodyPr>
+          <a:lstStyle/>
+          <a:p>
+            <a:r>
+              <a:rPr lang="en-US" altLang="ja-JP" smtClean="0"/>
+              <a:t>c2</a:t>
+            </a:r>
+            <a:endParaRPr lang="ja-JP" altLang="en-US" dirty="0"/>
+          </a:p>
+        </p:txBody>
+      </p:sp>
+      <p:sp>
+        <p:nvSpPr>
+          <p:cNvPr id="75" name="正方形/長方形 74"/>
+          <p:cNvSpPr/>
+          <p:nvPr/>
+        </p:nvSpPr>
+        <p:spPr>
+          <a:xfrm>
+            <a:off x="5248245" y="1895023"/>
+            <a:ext cx="431528" cy="369332"/>
+          </a:xfrm>
+          <a:prstGeom prst="rect">
+            <a:avLst/>
+          </a:prstGeom>
+        </p:spPr>
+        <p:txBody>
+          <a:bodyPr wrap="none">
+            <a:spAutoFit/>
+          </a:bodyPr>
+          <a:lstStyle/>
+          <a:p>
+            <a:r>
+              <a:rPr lang="en-US" altLang="ja-JP" dirty="0" smtClean="0"/>
+              <a:t>c3</a:t>
+            </a:r>
+            <a:endParaRPr lang="ja-JP" altLang="en-US" dirty="0"/>
+          </a:p>
+        </p:txBody>
+      </p:sp>
+      <p:sp>
+        <p:nvSpPr>
+          <p:cNvPr id="76" name="正方形/長方形 75"/>
+          <p:cNvSpPr/>
+          <p:nvPr/>
+        </p:nvSpPr>
+        <p:spPr>
+          <a:xfrm>
+            <a:off x="7163684" y="1912019"/>
+            <a:ext cx="661574" cy="369332"/>
+          </a:xfrm>
+          <a:prstGeom prst="rect">
+            <a:avLst/>
+          </a:prstGeom>
+        </p:spPr>
+        <p:txBody>
+          <a:bodyPr wrap="square">
+            <a:spAutoFit/>
+          </a:bodyPr>
+          <a:lstStyle/>
+          <a:p>
+            <a:r>
+              <a:rPr lang="en-US" altLang="ja-JP" dirty="0" smtClean="0"/>
+              <a:t>c4</a:t>
+            </a:r>
+            <a:endParaRPr lang="ja-JP" altLang="en-US" dirty="0"/>
+          </a:p>
+        </p:txBody>
+      </p:sp>
+      <p:sp>
+        <p:nvSpPr>
+          <p:cNvPr id="77" name="正方形/長方形 76"/>
+          <p:cNvSpPr/>
+          <p:nvPr/>
+        </p:nvSpPr>
+        <p:spPr>
+          <a:xfrm>
+            <a:off x="10032927" y="2079689"/>
+            <a:ext cx="661574" cy="369332"/>
+          </a:xfrm>
+          <a:prstGeom prst="rect">
+            <a:avLst/>
+          </a:prstGeom>
+        </p:spPr>
+        <p:txBody>
+          <a:bodyPr wrap="square">
+            <a:spAutoFit/>
+          </a:bodyPr>
+          <a:lstStyle/>
+          <a:p>
+            <a:r>
+              <a:rPr lang="en-US" altLang="ja-JP" dirty="0" smtClean="0"/>
+              <a:t>c5</a:t>
+            </a:r>
+            <a:endParaRPr lang="ja-JP" altLang="en-US" dirty="0"/>
+          </a:p>
+        </p:txBody>
+      </p:sp>
+      <p:sp>
+        <p:nvSpPr>
+          <p:cNvPr id="78" name="正方形/長方形 77"/>
+          <p:cNvSpPr/>
+          <p:nvPr/>
+        </p:nvSpPr>
+        <p:spPr>
+          <a:xfrm>
+            <a:off x="570043" y="4307855"/>
+            <a:ext cx="661574" cy="369332"/>
+          </a:xfrm>
+          <a:prstGeom prst="rect">
+            <a:avLst/>
+          </a:prstGeom>
+        </p:spPr>
+        <p:txBody>
+          <a:bodyPr wrap="square">
+            <a:spAutoFit/>
+          </a:bodyPr>
+          <a:lstStyle/>
+          <a:p>
+            <a:r>
+              <a:rPr lang="en-US" altLang="ja-JP" dirty="0" smtClean="0"/>
+              <a:t>c6</a:t>
+            </a:r>
+            <a:endParaRPr lang="ja-JP" altLang="en-US" dirty="0"/>
+          </a:p>
+        </p:txBody>
+      </p:sp>
+      <p:sp>
+        <p:nvSpPr>
+          <p:cNvPr id="79" name="正方形/長方形 78"/>
+          <p:cNvSpPr/>
+          <p:nvPr/>
+        </p:nvSpPr>
+        <p:spPr>
+          <a:xfrm>
+            <a:off x="4418859" y="4134171"/>
+            <a:ext cx="661574" cy="369332"/>
+          </a:xfrm>
+          <a:prstGeom prst="rect">
+            <a:avLst/>
+          </a:prstGeom>
+        </p:spPr>
+        <p:txBody>
+          <a:bodyPr wrap="square">
+            <a:spAutoFit/>
+          </a:bodyPr>
+          <a:lstStyle/>
+          <a:p>
+            <a:r>
+              <a:rPr lang="en-US" altLang="ja-JP" dirty="0" smtClean="0"/>
+              <a:t>c7</a:t>
+            </a:r>
+            <a:endParaRPr lang="ja-JP" altLang="en-US" dirty="0"/>
+          </a:p>
+        </p:txBody>
+      </p:sp>
+      <p:grpSp>
+        <p:nvGrpSpPr>
+          <p:cNvPr id="105" name="図形グループ 104"/>
+          <p:cNvGrpSpPr/>
+          <p:nvPr/>
+        </p:nvGrpSpPr>
+        <p:grpSpPr>
+          <a:xfrm>
+            <a:off x="8549229" y="4242285"/>
+            <a:ext cx="3074360" cy="1066139"/>
+            <a:chOff x="8549229" y="4242285"/>
+            <a:chExt cx="3074360" cy="1066139"/>
+          </a:xfrm>
+        </p:grpSpPr>
+        <p:grpSp>
+          <p:nvGrpSpPr>
+            <p:cNvPr id="92" name="図形グループ 91"/>
+            <p:cNvGrpSpPr/>
+            <p:nvPr/>
+          </p:nvGrpSpPr>
+          <p:grpSpPr>
+            <a:xfrm>
+              <a:off x="8549229" y="4242285"/>
+              <a:ext cx="3074360" cy="1066139"/>
+              <a:chOff x="8549229" y="4242285"/>
+              <a:chExt cx="3074360" cy="1066139"/>
+            </a:xfrm>
+          </p:grpSpPr>
+          <p:grpSp>
+            <p:nvGrpSpPr>
+              <p:cNvPr id="82" name="図形グループ 81"/>
+              <p:cNvGrpSpPr/>
+              <p:nvPr/>
+            </p:nvGrpSpPr>
+            <p:grpSpPr>
+              <a:xfrm>
+                <a:off x="8549229" y="4242285"/>
+                <a:ext cx="3074360" cy="819378"/>
+                <a:chOff x="783106" y="2337855"/>
+                <a:chExt cx="3074360" cy="819378"/>
+              </a:xfrm>
+            </p:grpSpPr>
+            <p:sp>
+              <p:nvSpPr>
+                <p:cNvPr id="83" name="テキスト ボックス 82"/>
+                <p:cNvSpPr txBox="1"/>
+                <p:nvPr/>
+              </p:nvSpPr>
+              <p:spPr>
+                <a:xfrm>
+                  <a:off x="1898247" y="2337855"/>
+                  <a:ext cx="1109469" cy="307777"/>
+                </a:xfrm>
+                <a:prstGeom prst="rect">
+                  <a:avLst/>
+                </a:prstGeom>
+                <a:noFill/>
+              </p:spPr>
+              <p:txBody>
+                <a:bodyPr wrap="square" rtlCol="0">
+                  <a:spAutoFit/>
+                </a:bodyPr>
+                <a:lstStyle/>
+                <a:p>
+                  <a:r>
+                    <a:rPr lang="en-US" altLang="ja-JP" sz="1400" dirty="0" smtClean="0">
+                      <a:latin typeface="Helvetica Neue" charset="0"/>
+                      <a:ea typeface="Helvetica Neue" charset="0"/>
+                      <a:cs typeface="Helvetica Neue" charset="0"/>
+                    </a:rPr>
+                    <a:t>OCO-</a:t>
+                  </a:r>
+                  <a:r>
+                    <a:rPr lang="en-US" altLang="ja-JP" sz="1400" b="1" dirty="0" smtClean="0">
+                      <a:latin typeface="Helvetica Neue" charset="0"/>
+                      <a:ea typeface="Helvetica Neue" charset="0"/>
+                      <a:cs typeface="Helvetica Neue" charset="0"/>
+                    </a:rPr>
+                    <a:t>R1</a:t>
+                  </a:r>
+                  <a:endParaRPr lang="ja-JP" altLang="en-US" sz="1400" b="1" dirty="0">
+                    <a:latin typeface="Helvetica Neue" charset="0"/>
+                    <a:ea typeface="Helvetica Neue" charset="0"/>
+                    <a:cs typeface="Helvetica Neue" charset="0"/>
+                  </a:endParaRPr>
+                </a:p>
+              </p:txBody>
+            </p:sp>
+            <p:sp>
+              <p:nvSpPr>
+                <p:cNvPr id="84" name="テキスト ボックス 83"/>
+                <p:cNvSpPr txBox="1"/>
+                <p:nvPr/>
+              </p:nvSpPr>
+              <p:spPr>
+                <a:xfrm>
+                  <a:off x="783106" y="2593232"/>
+                  <a:ext cx="908356" cy="307777"/>
+                </a:xfrm>
+                <a:prstGeom prst="rect">
+                  <a:avLst/>
+                </a:prstGeom>
+                <a:noFill/>
+              </p:spPr>
+              <p:txBody>
+                <a:bodyPr wrap="square" rtlCol="0">
+                  <a:spAutoFit/>
+                </a:bodyPr>
+                <a:lstStyle/>
+                <a:p>
+                  <a:pPr algn="r"/>
+                  <a:r>
+                    <a:rPr lang="en-US" altLang="ja-JP" sz="1400" b="1" dirty="0" smtClean="0">
+                      <a:latin typeface="Helvetica Neue" charset="0"/>
+                      <a:ea typeface="Helvetica Neue" charset="0"/>
+                      <a:cs typeface="Helvetica Neue" charset="0"/>
+                    </a:rPr>
+                    <a:t>R2</a:t>
+                  </a:r>
+                  <a:r>
+                    <a:rPr lang="en-US" altLang="ja-JP" sz="1400" dirty="0" smtClean="0">
+                      <a:latin typeface="Helvetica Neue" charset="0"/>
+                      <a:ea typeface="Helvetica Neue" charset="0"/>
+                      <a:cs typeface="Helvetica Neue" charset="0"/>
+                    </a:rPr>
+                    <a:t>-COO</a:t>
+                  </a:r>
+                  <a:endParaRPr lang="ja-JP" altLang="en-US" sz="1400" dirty="0">
+                    <a:latin typeface="Helvetica Neue" charset="0"/>
+                    <a:ea typeface="Helvetica Neue" charset="0"/>
+                    <a:cs typeface="Helvetica Neue" charset="0"/>
+                  </a:endParaRPr>
+                </a:p>
+              </p:txBody>
+            </p:sp>
+            <p:sp>
+              <p:nvSpPr>
+                <p:cNvPr id="85" name="テキスト ボックス 84"/>
+                <p:cNvSpPr txBox="1"/>
+                <p:nvPr/>
+              </p:nvSpPr>
+              <p:spPr>
+                <a:xfrm>
+                  <a:off x="1895649" y="2849456"/>
+                  <a:ext cx="1961817" cy="307777"/>
+                </a:xfrm>
+                <a:prstGeom prst="rect">
+                  <a:avLst/>
+                </a:prstGeom>
+                <a:noFill/>
+              </p:spPr>
+              <p:txBody>
+                <a:bodyPr wrap="square" rtlCol="0">
+                  <a:spAutoFit/>
+                </a:bodyPr>
+                <a:lstStyle/>
+                <a:p>
+                  <a:r>
+                    <a:rPr lang="en-US" altLang="ja-JP" sz="1400" dirty="0" smtClean="0">
+                      <a:latin typeface="Helvetica Neue" charset="0"/>
+                      <a:ea typeface="Helvetica Neue" charset="0"/>
+                      <a:cs typeface="Helvetica Neue" charset="0"/>
+                    </a:rPr>
+                    <a:t>O-PO</a:t>
+                  </a:r>
+                  <a:r>
+                    <a:rPr lang="en-US" altLang="ja-JP" sz="1100" dirty="0" smtClean="0">
+                      <a:latin typeface="Helvetica Neue" charset="0"/>
+                      <a:ea typeface="Helvetica Neue" charset="0"/>
+                      <a:cs typeface="Helvetica Neue" charset="0"/>
+                    </a:rPr>
+                    <a:t>2</a:t>
+                  </a:r>
+                  <a:r>
+                    <a:rPr lang="en-US" altLang="ja-JP" sz="1400" dirty="0" smtClean="0">
+                      <a:latin typeface="Helvetica Neue" charset="0"/>
+                      <a:ea typeface="Helvetica Neue" charset="0"/>
+                      <a:cs typeface="Helvetica Neue" charset="0"/>
+                    </a:rPr>
+                    <a:t>-O-CH2CHNH2</a:t>
+                  </a:r>
+                </a:p>
+              </p:txBody>
+            </p:sp>
+            <p:cxnSp>
+              <p:nvCxnSpPr>
+                <p:cNvPr id="86" name="直線コネクタ 85"/>
+                <p:cNvCxnSpPr/>
+                <p:nvPr/>
+              </p:nvCxnSpPr>
+              <p:spPr>
+                <a:xfrm>
+                  <a:off x="1794076" y="2498279"/>
+                  <a:ext cx="0" cy="540000"/>
+                </a:xfrm>
+                <a:prstGeom prst="line">
+                  <a:avLst/>
+                </a:prstGeom>
+                <a:ln w="28575">
+                  <a:solidFill>
+                    <a:schemeClr val="tx1"/>
+                  </a:solidFill>
+                </a:ln>
+              </p:spPr>
+              <p:style>
+                <a:lnRef idx="1">
+                  <a:schemeClr val="accent1"/>
+                </a:lnRef>
+                <a:fillRef idx="0">
+                  <a:schemeClr val="accent1"/>
+                </a:fillRef>
+                <a:effectRef idx="0">
+                  <a:schemeClr val="accent1"/>
+                </a:effectRef>
+                <a:fontRef idx="minor">
+                  <a:schemeClr val="tx1"/>
+                </a:fontRef>
+              </p:style>
+            </p:cxnSp>
+            <p:cxnSp>
+              <p:nvCxnSpPr>
+                <p:cNvPr id="87" name="直線コネクタ 86"/>
+                <p:cNvCxnSpPr/>
+                <p:nvPr/>
+              </p:nvCxnSpPr>
+              <p:spPr>
+                <a:xfrm rot="16200000">
+                  <a:off x="1884075" y="2413302"/>
+                  <a:ext cx="0" cy="180000"/>
+                </a:xfrm>
+                <a:prstGeom prst="line">
+                  <a:avLst/>
+                </a:prstGeom>
+                <a:ln w="28575">
+                  <a:solidFill>
+                    <a:schemeClr val="tx1"/>
+                  </a:solidFill>
+                </a:ln>
+              </p:spPr>
+              <p:style>
+                <a:lnRef idx="1">
+                  <a:schemeClr val="accent1"/>
+                </a:lnRef>
+                <a:fillRef idx="0">
+                  <a:schemeClr val="accent1"/>
+                </a:fillRef>
+                <a:effectRef idx="0">
+                  <a:schemeClr val="accent1"/>
+                </a:effectRef>
+                <a:fontRef idx="minor">
+                  <a:schemeClr val="tx1"/>
+                </a:fontRef>
+              </p:style>
+            </p:cxnSp>
+            <p:cxnSp>
+              <p:nvCxnSpPr>
+                <p:cNvPr id="88" name="直線コネクタ 87"/>
+                <p:cNvCxnSpPr/>
+                <p:nvPr/>
+              </p:nvCxnSpPr>
+              <p:spPr>
+                <a:xfrm rot="16200000">
+                  <a:off x="1884075" y="2935579"/>
+                  <a:ext cx="0" cy="180000"/>
+                </a:xfrm>
+                <a:prstGeom prst="line">
+                  <a:avLst/>
+                </a:prstGeom>
+                <a:ln w="28575">
+                  <a:solidFill>
+                    <a:schemeClr val="tx1"/>
+                  </a:solidFill>
+                </a:ln>
+              </p:spPr>
+              <p:style>
+                <a:lnRef idx="1">
+                  <a:schemeClr val="accent1"/>
+                </a:lnRef>
+                <a:fillRef idx="0">
+                  <a:schemeClr val="accent1"/>
+                </a:fillRef>
+                <a:effectRef idx="0">
+                  <a:schemeClr val="accent1"/>
+                </a:effectRef>
+                <a:fontRef idx="minor">
+                  <a:schemeClr val="tx1"/>
+                </a:fontRef>
+              </p:style>
+            </p:cxnSp>
+            <p:cxnSp>
+              <p:nvCxnSpPr>
+                <p:cNvPr id="89" name="直線コネクタ 88"/>
+                <p:cNvCxnSpPr/>
+                <p:nvPr/>
+              </p:nvCxnSpPr>
+              <p:spPr>
+                <a:xfrm rot="16200000">
+                  <a:off x="1704074" y="2686497"/>
+                  <a:ext cx="0" cy="180000"/>
+                </a:xfrm>
+                <a:prstGeom prst="line">
+                  <a:avLst/>
+                </a:prstGeom>
+                <a:ln w="28575">
+                  <a:solidFill>
+                    <a:schemeClr val="tx1"/>
+                  </a:solidFill>
+                </a:ln>
+              </p:spPr>
+              <p:style>
+                <a:lnRef idx="1">
+                  <a:schemeClr val="accent1"/>
+                </a:lnRef>
+                <a:fillRef idx="0">
+                  <a:schemeClr val="accent1"/>
+                </a:fillRef>
+                <a:effectRef idx="0">
+                  <a:schemeClr val="accent1"/>
+                </a:effectRef>
+                <a:fontRef idx="minor">
+                  <a:schemeClr val="tx1"/>
+                </a:fontRef>
+              </p:style>
+            </p:cxnSp>
+          </p:grpSp>
+          <p:sp>
+            <p:nvSpPr>
+              <p:cNvPr id="90" name="正方形/長方形 89"/>
+              <p:cNvSpPr/>
+              <p:nvPr/>
+            </p:nvSpPr>
+            <p:spPr>
+              <a:xfrm>
+                <a:off x="10832584" y="5000647"/>
+                <a:ext cx="716863" cy="307777"/>
+              </a:xfrm>
+              <a:prstGeom prst="rect">
+                <a:avLst/>
+              </a:prstGeom>
+            </p:spPr>
+            <p:txBody>
+              <a:bodyPr wrap="none">
+                <a:spAutoFit/>
+              </a:bodyPr>
+              <a:lstStyle/>
+              <a:p>
+                <a:r>
+                  <a:rPr lang="en-US" altLang="ja-JP" sz="1400" smtClean="0">
+                    <a:latin typeface="Helvetica Neue" charset="0"/>
+                    <a:ea typeface="Helvetica Neue" charset="0"/>
+                    <a:cs typeface="Helvetica Neue" charset="0"/>
+                  </a:rPr>
+                  <a:t>COOH</a:t>
+                </a:r>
+                <a:endParaRPr lang="ja-JP" altLang="en-US" sz="1400" dirty="0"/>
+              </a:p>
+            </p:txBody>
+          </p:sp>
+        </p:grpSp>
+        <p:cxnSp>
+          <p:nvCxnSpPr>
+            <p:cNvPr id="91" name="直線コネクタ 90"/>
+            <p:cNvCxnSpPr/>
+            <p:nvPr/>
+          </p:nvCxnSpPr>
+          <p:spPr>
+            <a:xfrm>
+              <a:off x="10980608" y="5000647"/>
+              <a:ext cx="0" cy="72000"/>
+            </a:xfrm>
+            <a:prstGeom prst="line">
+              <a:avLst/>
+            </a:prstGeom>
+            <a:ln w="28575">
+              <a:solidFill>
+                <a:schemeClr val="tx1"/>
+              </a:solidFill>
+            </a:ln>
+          </p:spPr>
+          <p:style>
+            <a:lnRef idx="1">
+              <a:schemeClr val="accent1"/>
+            </a:lnRef>
+            <a:fillRef idx="0">
+              <a:schemeClr val="accent1"/>
+            </a:fillRef>
+            <a:effectRef idx="0">
+              <a:schemeClr val="accent1"/>
+            </a:effectRef>
+            <a:fontRef idx="minor">
+              <a:schemeClr val="tx1"/>
+            </a:fontRef>
+          </p:style>
+        </p:cxnSp>
+      </p:grpSp>
+      <p:sp>
+        <p:nvSpPr>
+          <p:cNvPr id="93" name="正方形/長方形 92"/>
+          <p:cNvSpPr/>
+          <p:nvPr/>
+        </p:nvSpPr>
+        <p:spPr>
+          <a:xfrm>
+            <a:off x="8808104" y="4123189"/>
+            <a:ext cx="661574" cy="369332"/>
+          </a:xfrm>
+          <a:prstGeom prst="rect">
+            <a:avLst/>
+          </a:prstGeom>
+        </p:spPr>
+        <p:txBody>
+          <a:bodyPr wrap="square">
+            <a:spAutoFit/>
+          </a:bodyPr>
+          <a:lstStyle/>
+          <a:p>
+            <a:r>
+              <a:rPr lang="en-US" altLang="ja-JP" dirty="0" smtClean="0"/>
+              <a:t>c8</a:t>
+            </a:r>
+            <a:endParaRPr lang="ja-JP" altLang="en-US" dirty="0"/>
+          </a:p>
+        </p:txBody>
+      </p:sp>
+      <p:grpSp>
+        <p:nvGrpSpPr>
+          <p:cNvPr id="95" name="図形グループ 94"/>
+          <p:cNvGrpSpPr/>
+          <p:nvPr/>
+        </p:nvGrpSpPr>
+        <p:grpSpPr>
+          <a:xfrm>
+            <a:off x="8692135" y="5571025"/>
+            <a:ext cx="3137400" cy="819378"/>
+            <a:chOff x="783106" y="2337855"/>
+            <a:chExt cx="3137400" cy="819378"/>
+          </a:xfrm>
+        </p:grpSpPr>
+        <p:sp>
+          <p:nvSpPr>
+            <p:cNvPr id="97" name="テキスト ボックス 96"/>
+            <p:cNvSpPr txBox="1"/>
+            <p:nvPr/>
+          </p:nvSpPr>
+          <p:spPr>
+            <a:xfrm>
+              <a:off x="1898247" y="2337855"/>
+              <a:ext cx="1109469" cy="307777"/>
+            </a:xfrm>
+            <a:prstGeom prst="rect">
+              <a:avLst/>
+            </a:prstGeom>
+            <a:noFill/>
+          </p:spPr>
+          <p:txBody>
+            <a:bodyPr wrap="square" rtlCol="0">
+              <a:spAutoFit/>
+            </a:bodyPr>
+            <a:lstStyle/>
+            <a:p>
+              <a:r>
+                <a:rPr lang="en-US" altLang="ja-JP" sz="1400" dirty="0" smtClean="0">
+                  <a:latin typeface="Helvetica Neue" charset="0"/>
+                  <a:ea typeface="Helvetica Neue" charset="0"/>
+                  <a:cs typeface="Helvetica Neue" charset="0"/>
+                </a:rPr>
+                <a:t>OCO-</a:t>
+              </a:r>
+              <a:r>
+                <a:rPr lang="en-US" altLang="ja-JP" sz="1400" b="1" dirty="0" smtClean="0">
+                  <a:latin typeface="Helvetica Neue" charset="0"/>
+                  <a:ea typeface="Helvetica Neue" charset="0"/>
+                  <a:cs typeface="Helvetica Neue" charset="0"/>
+                </a:rPr>
+                <a:t>R1</a:t>
+              </a:r>
+              <a:endParaRPr lang="ja-JP" altLang="en-US" sz="1400" b="1" dirty="0">
+                <a:latin typeface="Helvetica Neue" charset="0"/>
+                <a:ea typeface="Helvetica Neue" charset="0"/>
+                <a:cs typeface="Helvetica Neue" charset="0"/>
+              </a:endParaRPr>
+            </a:p>
+          </p:txBody>
+        </p:sp>
+        <p:sp>
+          <p:nvSpPr>
+            <p:cNvPr id="98" name="テキスト ボックス 97"/>
+            <p:cNvSpPr txBox="1"/>
+            <p:nvPr/>
+          </p:nvSpPr>
+          <p:spPr>
+            <a:xfrm>
+              <a:off x="783106" y="2593232"/>
+              <a:ext cx="908356" cy="307777"/>
+            </a:xfrm>
+            <a:prstGeom prst="rect">
+              <a:avLst/>
+            </a:prstGeom>
+            <a:noFill/>
+          </p:spPr>
+          <p:txBody>
+            <a:bodyPr wrap="square" rtlCol="0">
+              <a:spAutoFit/>
+            </a:bodyPr>
+            <a:lstStyle/>
+            <a:p>
+              <a:pPr algn="r"/>
+              <a:r>
+                <a:rPr lang="en-US" altLang="ja-JP" sz="1400" b="1" dirty="0" smtClean="0">
+                  <a:latin typeface="Helvetica Neue" charset="0"/>
+                  <a:ea typeface="Helvetica Neue" charset="0"/>
+                  <a:cs typeface="Helvetica Neue" charset="0"/>
+                </a:rPr>
+                <a:t>R2</a:t>
+              </a:r>
+              <a:r>
+                <a:rPr lang="en-US" altLang="ja-JP" sz="1400" dirty="0" smtClean="0">
+                  <a:latin typeface="Helvetica Neue" charset="0"/>
+                  <a:ea typeface="Helvetica Neue" charset="0"/>
+                  <a:cs typeface="Helvetica Neue" charset="0"/>
+                </a:rPr>
+                <a:t>-COO</a:t>
+              </a:r>
+              <a:endParaRPr lang="ja-JP" altLang="en-US" sz="1400" dirty="0">
+                <a:latin typeface="Helvetica Neue" charset="0"/>
+                <a:ea typeface="Helvetica Neue" charset="0"/>
+                <a:cs typeface="Helvetica Neue" charset="0"/>
+              </a:endParaRPr>
+            </a:p>
+          </p:txBody>
+        </p:sp>
+        <p:sp>
+          <p:nvSpPr>
+            <p:cNvPr id="99" name="テキスト ボックス 98"/>
+            <p:cNvSpPr txBox="1"/>
+            <p:nvPr/>
+          </p:nvSpPr>
+          <p:spPr>
+            <a:xfrm>
+              <a:off x="1895649" y="2849456"/>
+              <a:ext cx="2024857" cy="307777"/>
+            </a:xfrm>
+            <a:prstGeom prst="rect">
+              <a:avLst/>
+            </a:prstGeom>
+            <a:noFill/>
+          </p:spPr>
+          <p:txBody>
+            <a:bodyPr wrap="square" rtlCol="0">
+              <a:spAutoFit/>
+            </a:bodyPr>
+            <a:lstStyle/>
+            <a:p>
+              <a:r>
+                <a:rPr lang="en-US" altLang="ja-JP" sz="1400" dirty="0" smtClean="0">
+                  <a:latin typeface="Helvetica Neue" charset="0"/>
+                  <a:ea typeface="Helvetica Neue" charset="0"/>
+                  <a:cs typeface="Helvetica Neue" charset="0"/>
+                </a:rPr>
+                <a:t>O-PO</a:t>
+              </a:r>
+              <a:r>
+                <a:rPr lang="en-US" altLang="ja-JP" sz="1100" dirty="0" smtClean="0">
+                  <a:latin typeface="Helvetica Neue" charset="0"/>
+                  <a:ea typeface="Helvetica Neue" charset="0"/>
+                  <a:cs typeface="Helvetica Neue" charset="0"/>
+                </a:rPr>
+                <a:t>2</a:t>
+              </a:r>
+              <a:r>
+                <a:rPr lang="en-US" altLang="ja-JP" sz="1400" dirty="0" smtClean="0">
+                  <a:latin typeface="Helvetica Neue" charset="0"/>
+                  <a:ea typeface="Helvetica Neue" charset="0"/>
+                  <a:cs typeface="Helvetica Neue" charset="0"/>
+                </a:rPr>
+                <a:t>-O-CH</a:t>
+              </a:r>
+              <a:r>
+                <a:rPr lang="en-US" altLang="ja-JP" sz="1100" dirty="0" smtClean="0">
+                  <a:latin typeface="Helvetica Neue" charset="0"/>
+                  <a:ea typeface="Helvetica Neue" charset="0"/>
+                  <a:cs typeface="Helvetica Neue" charset="0"/>
+                </a:rPr>
+                <a:t>2</a:t>
+              </a:r>
+              <a:r>
+                <a:rPr lang="en-US" altLang="ja-JP" sz="1400" dirty="0" smtClean="0">
+                  <a:latin typeface="Helvetica Neue" charset="0"/>
+                  <a:ea typeface="Helvetica Neue" charset="0"/>
+                  <a:cs typeface="Helvetica Neue" charset="0"/>
+                </a:rPr>
+                <a:t>CH</a:t>
+              </a:r>
+              <a:r>
+                <a:rPr lang="en-US" altLang="ja-JP" sz="1100" dirty="0" smtClean="0">
+                  <a:latin typeface="Helvetica Neue" charset="0"/>
+                  <a:ea typeface="Helvetica Neue" charset="0"/>
+                  <a:cs typeface="Helvetica Neue" charset="0"/>
+                </a:rPr>
+                <a:t>2</a:t>
+              </a:r>
+              <a:r>
+                <a:rPr lang="en-US" altLang="ja-JP" sz="1400" dirty="0" smtClean="0">
+                  <a:latin typeface="Helvetica Neue" charset="0"/>
+                  <a:ea typeface="Helvetica Neue" charset="0"/>
+                  <a:cs typeface="Helvetica Neue" charset="0"/>
+                </a:rPr>
+                <a:t>NH</a:t>
+              </a:r>
+              <a:r>
+                <a:rPr lang="en-US" altLang="ja-JP" sz="1100" dirty="0" smtClean="0">
+                  <a:latin typeface="Helvetica Neue" charset="0"/>
+                  <a:ea typeface="Helvetica Neue" charset="0"/>
+                  <a:cs typeface="Helvetica Neue" charset="0"/>
+                </a:rPr>
+                <a:t>2</a:t>
+              </a:r>
+              <a:endParaRPr lang="en-US" altLang="ja-JP" sz="1400" dirty="0" smtClean="0">
+                <a:latin typeface="Helvetica Neue" charset="0"/>
+                <a:ea typeface="Helvetica Neue" charset="0"/>
+                <a:cs typeface="Helvetica Neue" charset="0"/>
+              </a:endParaRPr>
+            </a:p>
+          </p:txBody>
+        </p:sp>
+        <p:cxnSp>
+          <p:nvCxnSpPr>
+            <p:cNvPr id="100" name="直線コネクタ 99"/>
+            <p:cNvCxnSpPr/>
+            <p:nvPr/>
+          </p:nvCxnSpPr>
+          <p:spPr>
+            <a:xfrm>
+              <a:off x="1794076" y="2498279"/>
+              <a:ext cx="0" cy="540000"/>
+            </a:xfrm>
+            <a:prstGeom prst="line">
+              <a:avLst/>
+            </a:prstGeom>
+            <a:ln w="28575">
+              <a:solidFill>
+                <a:schemeClr val="tx1"/>
+              </a:solidFill>
+            </a:ln>
+          </p:spPr>
+          <p:style>
+            <a:lnRef idx="1">
+              <a:schemeClr val="accent1"/>
+            </a:lnRef>
+            <a:fillRef idx="0">
+              <a:schemeClr val="accent1"/>
+            </a:fillRef>
+            <a:effectRef idx="0">
+              <a:schemeClr val="accent1"/>
+            </a:effectRef>
+            <a:fontRef idx="minor">
+              <a:schemeClr val="tx1"/>
+            </a:fontRef>
+          </p:style>
+        </p:cxnSp>
+        <p:cxnSp>
+          <p:nvCxnSpPr>
+            <p:cNvPr id="101" name="直線コネクタ 100"/>
+            <p:cNvCxnSpPr/>
+            <p:nvPr/>
+          </p:nvCxnSpPr>
+          <p:spPr>
+            <a:xfrm rot="16200000">
+              <a:off x="1884075" y="2413302"/>
+              <a:ext cx="0" cy="180000"/>
+            </a:xfrm>
+            <a:prstGeom prst="line">
+              <a:avLst/>
+            </a:prstGeom>
+            <a:ln w="28575">
+              <a:solidFill>
+                <a:schemeClr val="tx1"/>
+              </a:solidFill>
+            </a:ln>
+          </p:spPr>
+          <p:style>
+            <a:lnRef idx="1">
+              <a:schemeClr val="accent1"/>
+            </a:lnRef>
+            <a:fillRef idx="0">
+              <a:schemeClr val="accent1"/>
+            </a:fillRef>
+            <a:effectRef idx="0">
+              <a:schemeClr val="accent1"/>
+            </a:effectRef>
+            <a:fontRef idx="minor">
+              <a:schemeClr val="tx1"/>
+            </a:fontRef>
+          </p:style>
+        </p:cxnSp>
+        <p:cxnSp>
+          <p:nvCxnSpPr>
+            <p:cNvPr id="102" name="直線コネクタ 101"/>
+            <p:cNvCxnSpPr/>
+            <p:nvPr/>
+          </p:nvCxnSpPr>
+          <p:spPr>
+            <a:xfrm rot="16200000">
+              <a:off x="1884075" y="2935579"/>
+              <a:ext cx="0" cy="180000"/>
+            </a:xfrm>
+            <a:prstGeom prst="line">
+              <a:avLst/>
+            </a:prstGeom>
+            <a:ln w="28575">
+              <a:solidFill>
+                <a:schemeClr val="tx1"/>
+              </a:solidFill>
+            </a:ln>
+          </p:spPr>
+          <p:style>
+            <a:lnRef idx="1">
+              <a:schemeClr val="accent1"/>
+            </a:lnRef>
+            <a:fillRef idx="0">
+              <a:schemeClr val="accent1"/>
+            </a:fillRef>
+            <a:effectRef idx="0">
+              <a:schemeClr val="accent1"/>
+            </a:effectRef>
+            <a:fontRef idx="minor">
+              <a:schemeClr val="tx1"/>
+            </a:fontRef>
+          </p:style>
+        </p:cxnSp>
+        <p:cxnSp>
+          <p:nvCxnSpPr>
+            <p:cNvPr id="103" name="直線コネクタ 102"/>
+            <p:cNvCxnSpPr/>
+            <p:nvPr/>
+          </p:nvCxnSpPr>
+          <p:spPr>
+            <a:xfrm rot="16200000">
+              <a:off x="1704074" y="2686497"/>
+              <a:ext cx="0" cy="180000"/>
+            </a:xfrm>
+            <a:prstGeom prst="line">
+              <a:avLst/>
+            </a:prstGeom>
+            <a:ln w="28575">
+              <a:solidFill>
+                <a:schemeClr val="tx1"/>
+              </a:solidFill>
+            </a:ln>
+          </p:spPr>
+          <p:style>
+            <a:lnRef idx="1">
+              <a:schemeClr val="accent1"/>
+            </a:lnRef>
+            <a:fillRef idx="0">
+              <a:schemeClr val="accent1"/>
+            </a:fillRef>
+            <a:effectRef idx="0">
+              <a:schemeClr val="accent1"/>
+            </a:effectRef>
+            <a:fontRef idx="minor">
+              <a:schemeClr val="tx1"/>
+            </a:fontRef>
+          </p:style>
+        </p:cxnSp>
+      </p:grpSp>
+      <p:sp>
+        <p:nvSpPr>
+          <p:cNvPr id="104" name="正方形/長方形 103"/>
+          <p:cNvSpPr/>
+          <p:nvPr/>
+        </p:nvSpPr>
+        <p:spPr>
+          <a:xfrm>
+            <a:off x="8763376" y="5355581"/>
+            <a:ext cx="661574" cy="369332"/>
+          </a:xfrm>
+          <a:prstGeom prst="rect">
+            <a:avLst/>
+          </a:prstGeom>
+        </p:spPr>
+        <p:txBody>
+          <a:bodyPr wrap="square">
+            <a:spAutoFit/>
+          </a:bodyPr>
+          <a:lstStyle/>
+          <a:p>
+            <a:r>
+              <a:rPr lang="en-US" altLang="ja-JP" dirty="0" smtClean="0"/>
+              <a:t>c9</a:t>
+            </a:r>
+            <a:endParaRPr lang="ja-JP" altLang="en-US" dirty="0"/>
+          </a:p>
+        </p:txBody>
+      </p:sp>
     </p:spTree>
     <p:extLst>
       <p:ext uri="{BB962C8B-B14F-4D97-AF65-F5344CB8AC3E}">
@@ -4622,6 +6854,1506 @@
   <p:clrMapOvr>
     <a:masterClrMapping/>
   </p:clrMapOvr>
+  <p:timing>
+    <p:tnLst>
+      <p:par>
+        <p:cTn xmlns:p14="http://schemas.microsoft.com/office/powerpoint/2010/main" id="1" dur="indefinite" restart="never" nodeType="tmRoot"/>
+      </p:par>
+    </p:tnLst>
+  </p:timing>
+</p:sld>
+</file>
+
+<file path=ppt/slides/slide2.xml><?xml version="1.0" encoding="utf-8"?>
+<p:sld xmlns:a="http://schemas.openxmlformats.org/drawingml/2006/main" xmlns:r="http://schemas.openxmlformats.org/officeDocument/2006/relationships" xmlns:p="http://schemas.openxmlformats.org/presentationml/2006/main">
+  <p:cSld>
+    <p:spTree>
+      <p:nvGrpSpPr>
+        <p:cNvPr id="1" name=""/>
+        <p:cNvGrpSpPr/>
+        <p:nvPr/>
+      </p:nvGrpSpPr>
+      <p:grpSpPr>
+        <a:xfrm>
+          <a:off x="0" y="0"/>
+          <a:ext cx="0" cy="0"/>
+          <a:chOff x="0" y="0"/>
+          <a:chExt cx="0" cy="0"/>
+        </a:xfrm>
+      </p:grpSpPr>
+      <p:grpSp>
+        <p:nvGrpSpPr>
+          <p:cNvPr id="18" name="図形グループ 17"/>
+          <p:cNvGrpSpPr/>
+          <p:nvPr/>
+        </p:nvGrpSpPr>
+        <p:grpSpPr>
+          <a:xfrm>
+            <a:off x="1414425" y="958518"/>
+            <a:ext cx="3869843" cy="1049330"/>
+            <a:chOff x="1414425" y="958518"/>
+            <a:chExt cx="3869843" cy="1049330"/>
+          </a:xfrm>
+        </p:grpSpPr>
+        <p:grpSp>
+          <p:nvGrpSpPr>
+            <p:cNvPr id="4" name="図形グループ 3"/>
+            <p:cNvGrpSpPr/>
+            <p:nvPr/>
+          </p:nvGrpSpPr>
+          <p:grpSpPr>
+            <a:xfrm>
+              <a:off x="1414425" y="958518"/>
+              <a:ext cx="3869843" cy="1049330"/>
+              <a:chOff x="8549229" y="4242285"/>
+              <a:chExt cx="3869843" cy="1049330"/>
+            </a:xfrm>
+          </p:grpSpPr>
+          <p:grpSp>
+            <p:nvGrpSpPr>
+              <p:cNvPr id="5" name="図形グループ 4"/>
+              <p:cNvGrpSpPr/>
+              <p:nvPr/>
+            </p:nvGrpSpPr>
+            <p:grpSpPr>
+              <a:xfrm>
+                <a:off x="8549229" y="4242285"/>
+                <a:ext cx="3869843" cy="1049330"/>
+                <a:chOff x="8549229" y="4242285"/>
+                <a:chExt cx="3869843" cy="1049330"/>
+              </a:xfrm>
+            </p:grpSpPr>
+            <p:grpSp>
+              <p:nvGrpSpPr>
+                <p:cNvPr id="7" name="図形グループ 6"/>
+                <p:cNvGrpSpPr/>
+                <p:nvPr/>
+              </p:nvGrpSpPr>
+              <p:grpSpPr>
+                <a:xfrm>
+                  <a:off x="8549229" y="4242285"/>
+                  <a:ext cx="3869843" cy="819378"/>
+                  <a:chOff x="783106" y="2337855"/>
+                  <a:chExt cx="3869843" cy="819378"/>
+                </a:xfrm>
+              </p:grpSpPr>
+              <p:sp>
+                <p:nvSpPr>
+                  <p:cNvPr id="9" name="テキスト ボックス 8"/>
+                  <p:cNvSpPr txBox="1"/>
+                  <p:nvPr/>
+                </p:nvSpPr>
+                <p:spPr>
+                  <a:xfrm>
+                    <a:off x="1898247" y="2337855"/>
+                    <a:ext cx="1109469" cy="307777"/>
+                  </a:xfrm>
+                  <a:prstGeom prst="rect">
+                    <a:avLst/>
+                  </a:prstGeom>
+                  <a:noFill/>
+                </p:spPr>
+                <p:txBody>
+                  <a:bodyPr wrap="square" rtlCol="0">
+                    <a:spAutoFit/>
+                  </a:bodyPr>
+                  <a:lstStyle/>
+                  <a:p>
+                    <a:r>
+                      <a:rPr lang="en-US" altLang="ja-JP" sz="1400" dirty="0" smtClean="0">
+                        <a:latin typeface="Helvetica Neue" charset="0"/>
+                        <a:ea typeface="Helvetica Neue" charset="0"/>
+                        <a:cs typeface="Helvetica Neue" charset="0"/>
+                      </a:rPr>
+                      <a:t>OCO-</a:t>
+                    </a:r>
+                    <a:r>
+                      <a:rPr lang="en-US" altLang="ja-JP" sz="1400" b="1" dirty="0" smtClean="0">
+                        <a:latin typeface="Helvetica Neue" charset="0"/>
+                        <a:ea typeface="Helvetica Neue" charset="0"/>
+                        <a:cs typeface="Helvetica Neue" charset="0"/>
+                      </a:rPr>
+                      <a:t>R1</a:t>
+                    </a:r>
+                    <a:endParaRPr lang="ja-JP" altLang="en-US" sz="1400" b="1" dirty="0">
+                      <a:latin typeface="Helvetica Neue" charset="0"/>
+                      <a:ea typeface="Helvetica Neue" charset="0"/>
+                      <a:cs typeface="Helvetica Neue" charset="0"/>
+                    </a:endParaRPr>
+                  </a:p>
+                </p:txBody>
+              </p:sp>
+              <p:sp>
+                <p:nvSpPr>
+                  <p:cNvPr id="10" name="テキスト ボックス 9"/>
+                  <p:cNvSpPr txBox="1"/>
+                  <p:nvPr/>
+                </p:nvSpPr>
+                <p:spPr>
+                  <a:xfrm>
+                    <a:off x="783106" y="2593232"/>
+                    <a:ext cx="908356" cy="307777"/>
+                  </a:xfrm>
+                  <a:prstGeom prst="rect">
+                    <a:avLst/>
+                  </a:prstGeom>
+                  <a:noFill/>
+                </p:spPr>
+                <p:txBody>
+                  <a:bodyPr wrap="square" rtlCol="0">
+                    <a:spAutoFit/>
+                  </a:bodyPr>
+                  <a:lstStyle/>
+                  <a:p>
+                    <a:pPr algn="r"/>
+                    <a:r>
+                      <a:rPr lang="en-US" altLang="ja-JP" sz="1400" b="1" dirty="0" smtClean="0">
+                        <a:latin typeface="Helvetica Neue" charset="0"/>
+                        <a:ea typeface="Helvetica Neue" charset="0"/>
+                        <a:cs typeface="Helvetica Neue" charset="0"/>
+                      </a:rPr>
+                      <a:t>R2</a:t>
+                    </a:r>
+                    <a:r>
+                      <a:rPr lang="en-US" altLang="ja-JP" sz="1400" dirty="0" smtClean="0">
+                        <a:latin typeface="Helvetica Neue" charset="0"/>
+                        <a:ea typeface="Helvetica Neue" charset="0"/>
+                        <a:cs typeface="Helvetica Neue" charset="0"/>
+                      </a:rPr>
+                      <a:t>-COO</a:t>
+                    </a:r>
+                    <a:endParaRPr lang="ja-JP" altLang="en-US" sz="1400" dirty="0">
+                      <a:latin typeface="Helvetica Neue" charset="0"/>
+                      <a:ea typeface="Helvetica Neue" charset="0"/>
+                      <a:cs typeface="Helvetica Neue" charset="0"/>
+                    </a:endParaRPr>
+                  </a:p>
+                </p:txBody>
+              </p:sp>
+              <p:sp>
+                <p:nvSpPr>
+                  <p:cNvPr id="11" name="テキスト ボックス 10"/>
+                  <p:cNvSpPr txBox="1"/>
+                  <p:nvPr/>
+                </p:nvSpPr>
+                <p:spPr>
+                  <a:xfrm>
+                    <a:off x="1895648" y="2849456"/>
+                    <a:ext cx="2757301" cy="307777"/>
+                  </a:xfrm>
+                  <a:prstGeom prst="rect">
+                    <a:avLst/>
+                  </a:prstGeom>
+                  <a:noFill/>
+                </p:spPr>
+                <p:txBody>
+                  <a:bodyPr wrap="square" rtlCol="0">
+                    <a:spAutoFit/>
+                  </a:bodyPr>
+                  <a:lstStyle/>
+                  <a:p>
+                    <a:r>
+                      <a:rPr lang="en-US" altLang="ja-JP" sz="1400" dirty="0" smtClean="0">
+                        <a:latin typeface="Helvetica Neue" charset="0"/>
+                        <a:ea typeface="Helvetica Neue" charset="0"/>
+                        <a:cs typeface="Helvetica Neue" charset="0"/>
+                      </a:rPr>
+                      <a:t>O-PO</a:t>
+                    </a:r>
+                    <a:r>
+                      <a:rPr lang="en-US" altLang="ja-JP" sz="1100" dirty="0" smtClean="0">
+                        <a:latin typeface="Helvetica Neue" charset="0"/>
+                        <a:ea typeface="Helvetica Neue" charset="0"/>
+                        <a:cs typeface="Helvetica Neue" charset="0"/>
+                      </a:rPr>
+                      <a:t>2</a:t>
+                    </a:r>
+                    <a:r>
+                      <a:rPr lang="en-US" altLang="ja-JP" sz="1400" dirty="0" smtClean="0">
+                        <a:latin typeface="Helvetica Neue" charset="0"/>
+                        <a:ea typeface="Helvetica Neue" charset="0"/>
+                        <a:cs typeface="Helvetica Neue" charset="0"/>
+                      </a:rPr>
+                      <a:t>-O-CH</a:t>
+                    </a:r>
+                    <a:r>
+                      <a:rPr lang="en-US" altLang="ja-JP" sz="1100" dirty="0" smtClean="0">
+                        <a:latin typeface="Helvetica Neue" charset="0"/>
+                        <a:ea typeface="Helvetica Neue" charset="0"/>
+                        <a:cs typeface="Helvetica Neue" charset="0"/>
+                      </a:rPr>
+                      <a:t>2</a:t>
+                    </a:r>
+                    <a:r>
+                      <a:rPr lang="en-US" altLang="ja-JP" sz="1400" dirty="0" smtClean="0">
+                        <a:latin typeface="Helvetica Neue" charset="0"/>
+                        <a:ea typeface="Helvetica Neue" charset="0"/>
+                        <a:cs typeface="Helvetica Neue" charset="0"/>
+                      </a:rPr>
+                      <a:t>CH</a:t>
+                    </a:r>
+                    <a:r>
+                      <a:rPr lang="en-US" altLang="ja-JP" sz="1100" dirty="0" smtClean="0">
+                        <a:latin typeface="Helvetica Neue" charset="0"/>
+                        <a:ea typeface="Helvetica Neue" charset="0"/>
+                        <a:cs typeface="Helvetica Neue" charset="0"/>
+                      </a:rPr>
+                      <a:t>2</a:t>
+                    </a:r>
+                    <a:r>
+                      <a:rPr lang="en-US" altLang="ja-JP" sz="1400" dirty="0" smtClean="0">
+                        <a:latin typeface="Helvetica Neue" charset="0"/>
+                        <a:ea typeface="Helvetica Neue" charset="0"/>
+                        <a:cs typeface="Helvetica Neue" charset="0"/>
+                      </a:rPr>
+                      <a:t>N</a:t>
+                    </a:r>
+                    <a:r>
+                      <a:rPr lang="en-US" altLang="ja-JP" sz="1400" baseline="30000" dirty="0" smtClean="0">
+                        <a:latin typeface="Helvetica Neue" charset="0"/>
+                        <a:ea typeface="Helvetica Neue" charset="0"/>
+                        <a:cs typeface="Helvetica Neue" charset="0"/>
+                      </a:rPr>
+                      <a:t>+</a:t>
+                    </a:r>
+                    <a:r>
+                      <a:rPr lang="en-US" altLang="ja-JP" sz="1400" dirty="0" smtClean="0">
+                        <a:latin typeface="Helvetica Neue" charset="0"/>
+                        <a:ea typeface="Helvetica Neue" charset="0"/>
+                        <a:cs typeface="Helvetica Neue" charset="0"/>
+                      </a:rPr>
+                      <a:t>CH</a:t>
+                    </a:r>
+                    <a:r>
+                      <a:rPr lang="en-US" altLang="ja-JP" sz="1100" dirty="0" smtClean="0">
+                        <a:latin typeface="Helvetica Neue" charset="0"/>
+                        <a:ea typeface="Helvetica Neue" charset="0"/>
+                        <a:cs typeface="Helvetica Neue" charset="0"/>
+                      </a:rPr>
+                      <a:t>3</a:t>
+                    </a:r>
+                    <a:endParaRPr lang="en-US" altLang="ja-JP" sz="1400" dirty="0" smtClean="0">
+                      <a:latin typeface="Helvetica Neue" charset="0"/>
+                      <a:ea typeface="Helvetica Neue" charset="0"/>
+                      <a:cs typeface="Helvetica Neue" charset="0"/>
+                    </a:endParaRPr>
+                  </a:p>
+                </p:txBody>
+              </p:sp>
+              <p:cxnSp>
+                <p:nvCxnSpPr>
+                  <p:cNvPr id="12" name="直線コネクタ 11"/>
+                  <p:cNvCxnSpPr/>
+                  <p:nvPr/>
+                </p:nvCxnSpPr>
+                <p:spPr>
+                  <a:xfrm>
+                    <a:off x="1794076" y="2498279"/>
+                    <a:ext cx="0" cy="540000"/>
+                  </a:xfrm>
+                  <a:prstGeom prst="line">
+                    <a:avLst/>
+                  </a:prstGeom>
+                  <a:ln w="28575">
+                    <a:solidFill>
+                      <a:schemeClr val="tx1"/>
+                    </a:solidFill>
+                  </a:ln>
+                </p:spPr>
+                <p:style>
+                  <a:lnRef idx="1">
+                    <a:schemeClr val="accent1"/>
+                  </a:lnRef>
+                  <a:fillRef idx="0">
+                    <a:schemeClr val="accent1"/>
+                  </a:fillRef>
+                  <a:effectRef idx="0">
+                    <a:schemeClr val="accent1"/>
+                  </a:effectRef>
+                  <a:fontRef idx="minor">
+                    <a:schemeClr val="tx1"/>
+                  </a:fontRef>
+                </p:style>
+              </p:cxnSp>
+              <p:cxnSp>
+                <p:nvCxnSpPr>
+                  <p:cNvPr id="13" name="直線コネクタ 12"/>
+                  <p:cNvCxnSpPr/>
+                  <p:nvPr/>
+                </p:nvCxnSpPr>
+                <p:spPr>
+                  <a:xfrm rot="16200000">
+                    <a:off x="1884075" y="2413302"/>
+                    <a:ext cx="0" cy="180000"/>
+                  </a:xfrm>
+                  <a:prstGeom prst="line">
+                    <a:avLst/>
+                  </a:prstGeom>
+                  <a:ln w="28575">
+                    <a:solidFill>
+                      <a:schemeClr val="tx1"/>
+                    </a:solidFill>
+                  </a:ln>
+                </p:spPr>
+                <p:style>
+                  <a:lnRef idx="1">
+                    <a:schemeClr val="accent1"/>
+                  </a:lnRef>
+                  <a:fillRef idx="0">
+                    <a:schemeClr val="accent1"/>
+                  </a:fillRef>
+                  <a:effectRef idx="0">
+                    <a:schemeClr val="accent1"/>
+                  </a:effectRef>
+                  <a:fontRef idx="minor">
+                    <a:schemeClr val="tx1"/>
+                  </a:fontRef>
+                </p:style>
+              </p:cxnSp>
+              <p:cxnSp>
+                <p:nvCxnSpPr>
+                  <p:cNvPr id="14" name="直線コネクタ 13"/>
+                  <p:cNvCxnSpPr/>
+                  <p:nvPr/>
+                </p:nvCxnSpPr>
+                <p:spPr>
+                  <a:xfrm rot="16200000">
+                    <a:off x="1884075" y="2935579"/>
+                    <a:ext cx="0" cy="180000"/>
+                  </a:xfrm>
+                  <a:prstGeom prst="line">
+                    <a:avLst/>
+                  </a:prstGeom>
+                  <a:ln w="28575">
+                    <a:solidFill>
+                      <a:schemeClr val="tx1"/>
+                    </a:solidFill>
+                  </a:ln>
+                </p:spPr>
+                <p:style>
+                  <a:lnRef idx="1">
+                    <a:schemeClr val="accent1"/>
+                  </a:lnRef>
+                  <a:fillRef idx="0">
+                    <a:schemeClr val="accent1"/>
+                  </a:fillRef>
+                  <a:effectRef idx="0">
+                    <a:schemeClr val="accent1"/>
+                  </a:effectRef>
+                  <a:fontRef idx="minor">
+                    <a:schemeClr val="tx1"/>
+                  </a:fontRef>
+                </p:style>
+              </p:cxnSp>
+              <p:cxnSp>
+                <p:nvCxnSpPr>
+                  <p:cNvPr id="15" name="直線コネクタ 14"/>
+                  <p:cNvCxnSpPr/>
+                  <p:nvPr/>
+                </p:nvCxnSpPr>
+                <p:spPr>
+                  <a:xfrm rot="16200000">
+                    <a:off x="1704074" y="2686497"/>
+                    <a:ext cx="0" cy="180000"/>
+                  </a:xfrm>
+                  <a:prstGeom prst="line">
+                    <a:avLst/>
+                  </a:prstGeom>
+                  <a:ln w="28575">
+                    <a:solidFill>
+                      <a:schemeClr val="tx1"/>
+                    </a:solidFill>
+                  </a:ln>
+                </p:spPr>
+                <p:style>
+                  <a:lnRef idx="1">
+                    <a:schemeClr val="accent1"/>
+                  </a:lnRef>
+                  <a:fillRef idx="0">
+                    <a:schemeClr val="accent1"/>
+                  </a:fillRef>
+                  <a:effectRef idx="0">
+                    <a:schemeClr val="accent1"/>
+                  </a:effectRef>
+                  <a:fontRef idx="minor">
+                    <a:schemeClr val="tx1"/>
+                  </a:fontRef>
+                </p:style>
+              </p:cxnSp>
+            </p:grpSp>
+            <p:sp>
+              <p:nvSpPr>
+                <p:cNvPr id="8" name="正方形/長方形 7"/>
+                <p:cNvSpPr/>
+                <p:nvPr/>
+              </p:nvSpPr>
+              <p:spPr>
+                <a:xfrm>
+                  <a:off x="11140592" y="4983838"/>
+                  <a:ext cx="522900" cy="307777"/>
+                </a:xfrm>
+                <a:prstGeom prst="rect">
+                  <a:avLst/>
+                </a:prstGeom>
+              </p:spPr>
+              <p:txBody>
+                <a:bodyPr wrap="none">
+                  <a:spAutoFit/>
+                </a:bodyPr>
+                <a:lstStyle/>
+                <a:p>
+                  <a:r>
+                    <a:rPr lang="en-US" altLang="ja-JP" sz="1400" dirty="0" smtClean="0">
+                      <a:latin typeface="Helvetica Neue" charset="0"/>
+                      <a:ea typeface="Helvetica Neue" charset="0"/>
+                      <a:cs typeface="Helvetica Neue" charset="0"/>
+                    </a:rPr>
+                    <a:t>CH</a:t>
+                  </a:r>
+                  <a:r>
+                    <a:rPr lang="en-US" altLang="ja-JP" sz="1100" dirty="0" smtClean="0">
+                      <a:latin typeface="Helvetica Neue" charset="0"/>
+                      <a:ea typeface="Helvetica Neue" charset="0"/>
+                      <a:cs typeface="Helvetica Neue" charset="0"/>
+                    </a:rPr>
+                    <a:t>3</a:t>
+                  </a:r>
+                  <a:endParaRPr lang="ja-JP" altLang="en-US" sz="1400" dirty="0"/>
+                </a:p>
+              </p:txBody>
+            </p:sp>
+          </p:grpSp>
+          <p:cxnSp>
+            <p:nvCxnSpPr>
+              <p:cNvPr id="6" name="直線コネクタ 5"/>
+              <p:cNvCxnSpPr/>
+              <p:nvPr/>
+            </p:nvCxnSpPr>
+            <p:spPr>
+              <a:xfrm>
+                <a:off x="11269368" y="5000647"/>
+                <a:ext cx="0" cy="72000"/>
+              </a:xfrm>
+              <a:prstGeom prst="line">
+                <a:avLst/>
+              </a:prstGeom>
+              <a:ln w="28575">
+                <a:solidFill>
+                  <a:schemeClr val="tx1"/>
+                </a:solidFill>
+              </a:ln>
+            </p:spPr>
+            <p:style>
+              <a:lnRef idx="1">
+                <a:schemeClr val="accent1"/>
+              </a:lnRef>
+              <a:fillRef idx="0">
+                <a:schemeClr val="accent1"/>
+              </a:fillRef>
+              <a:effectRef idx="0">
+                <a:schemeClr val="accent1"/>
+              </a:effectRef>
+              <a:fontRef idx="minor">
+                <a:schemeClr val="tx1"/>
+              </a:fontRef>
+            </p:style>
+          </p:cxnSp>
+        </p:grpSp>
+        <p:cxnSp>
+          <p:nvCxnSpPr>
+            <p:cNvPr id="16" name="直線コネクタ 15"/>
+            <p:cNvCxnSpPr/>
+            <p:nvPr/>
+          </p:nvCxnSpPr>
+          <p:spPr>
+            <a:xfrm>
+              <a:off x="4152211" y="1474644"/>
+              <a:ext cx="0" cy="72000"/>
+            </a:xfrm>
+            <a:prstGeom prst="line">
+              <a:avLst/>
+            </a:prstGeom>
+            <a:ln w="28575">
+              <a:solidFill>
+                <a:schemeClr val="tx1"/>
+              </a:solidFill>
+            </a:ln>
+          </p:spPr>
+          <p:style>
+            <a:lnRef idx="1">
+              <a:schemeClr val="accent1"/>
+            </a:lnRef>
+            <a:fillRef idx="0">
+              <a:schemeClr val="accent1"/>
+            </a:fillRef>
+            <a:effectRef idx="0">
+              <a:schemeClr val="accent1"/>
+            </a:effectRef>
+            <a:fontRef idx="minor">
+              <a:schemeClr val="tx1"/>
+            </a:fontRef>
+          </p:style>
+        </p:cxnSp>
+        <p:sp>
+          <p:nvSpPr>
+            <p:cNvPr id="17" name="正方形/長方形 16"/>
+            <p:cNvSpPr/>
+            <p:nvPr/>
+          </p:nvSpPr>
+          <p:spPr>
+            <a:xfrm>
+              <a:off x="4004183" y="1246080"/>
+              <a:ext cx="522900" cy="307777"/>
+            </a:xfrm>
+            <a:prstGeom prst="rect">
+              <a:avLst/>
+            </a:prstGeom>
+          </p:spPr>
+          <p:txBody>
+            <a:bodyPr wrap="none">
+              <a:spAutoFit/>
+            </a:bodyPr>
+            <a:lstStyle/>
+            <a:p>
+              <a:r>
+                <a:rPr lang="en-US" altLang="ja-JP" sz="1400" dirty="0" smtClean="0">
+                  <a:latin typeface="Helvetica Neue" charset="0"/>
+                  <a:ea typeface="Helvetica Neue" charset="0"/>
+                  <a:cs typeface="Helvetica Neue" charset="0"/>
+                </a:rPr>
+                <a:t>CH</a:t>
+              </a:r>
+              <a:r>
+                <a:rPr lang="en-US" altLang="ja-JP" sz="1100" dirty="0" smtClean="0">
+                  <a:latin typeface="Helvetica Neue" charset="0"/>
+                  <a:ea typeface="Helvetica Neue" charset="0"/>
+                  <a:cs typeface="Helvetica Neue" charset="0"/>
+                </a:rPr>
+                <a:t>3</a:t>
+              </a:r>
+              <a:endParaRPr lang="ja-JP" altLang="en-US" sz="1400" dirty="0"/>
+            </a:p>
+          </p:txBody>
+        </p:sp>
+      </p:grpSp>
+      <p:sp>
+        <p:nvSpPr>
+          <p:cNvPr id="19" name="正方形/長方形 18"/>
+          <p:cNvSpPr/>
+          <p:nvPr/>
+        </p:nvSpPr>
+        <p:spPr>
+          <a:xfrm>
+            <a:off x="1083638" y="2475622"/>
+            <a:ext cx="661574" cy="369332"/>
+          </a:xfrm>
+          <a:prstGeom prst="rect">
+            <a:avLst/>
+          </a:prstGeom>
+        </p:spPr>
+        <p:txBody>
+          <a:bodyPr wrap="square">
+            <a:spAutoFit/>
+          </a:bodyPr>
+          <a:lstStyle/>
+          <a:p>
+            <a:r>
+              <a:rPr lang="en-US" altLang="ja-JP" dirty="0" smtClean="0"/>
+              <a:t>c11</a:t>
+            </a:r>
+            <a:endParaRPr lang="ja-JP" altLang="en-US" dirty="0"/>
+          </a:p>
+        </p:txBody>
+      </p:sp>
+      <p:sp>
+        <p:nvSpPr>
+          <p:cNvPr id="20" name="正方形/長方形 19"/>
+          <p:cNvSpPr/>
+          <p:nvPr/>
+        </p:nvSpPr>
+        <p:spPr>
+          <a:xfrm>
+            <a:off x="1359429" y="895474"/>
+            <a:ext cx="661574" cy="369332"/>
+          </a:xfrm>
+          <a:prstGeom prst="rect">
+            <a:avLst/>
+          </a:prstGeom>
+        </p:spPr>
+        <p:txBody>
+          <a:bodyPr wrap="square">
+            <a:spAutoFit/>
+          </a:bodyPr>
+          <a:lstStyle/>
+          <a:p>
+            <a:r>
+              <a:rPr lang="en-US" altLang="ja-JP" smtClean="0"/>
+              <a:t>c10</a:t>
+            </a:r>
+            <a:endParaRPr lang="ja-JP" altLang="en-US" dirty="0"/>
+          </a:p>
+        </p:txBody>
+      </p:sp>
+      <p:grpSp>
+        <p:nvGrpSpPr>
+          <p:cNvPr id="44" name="図形グループ 43"/>
+          <p:cNvGrpSpPr/>
+          <p:nvPr/>
+        </p:nvGrpSpPr>
+        <p:grpSpPr>
+          <a:xfrm>
+            <a:off x="1258816" y="2693999"/>
+            <a:ext cx="2745367" cy="1342392"/>
+            <a:chOff x="1258816" y="2693999"/>
+            <a:chExt cx="2745367" cy="1342392"/>
+          </a:xfrm>
+        </p:grpSpPr>
+        <p:grpSp>
+          <p:nvGrpSpPr>
+            <p:cNvPr id="27" name="図形グループ 26"/>
+            <p:cNvGrpSpPr/>
+            <p:nvPr/>
+          </p:nvGrpSpPr>
+          <p:grpSpPr>
+            <a:xfrm>
+              <a:off x="1258816" y="2693999"/>
+              <a:ext cx="2224610" cy="819378"/>
+              <a:chOff x="783106" y="2337855"/>
+              <a:chExt cx="2224610" cy="819378"/>
+            </a:xfrm>
+          </p:grpSpPr>
+          <p:sp>
+            <p:nvSpPr>
+              <p:cNvPr id="29" name="テキスト ボックス 28"/>
+              <p:cNvSpPr txBox="1"/>
+              <p:nvPr/>
+            </p:nvSpPr>
+            <p:spPr>
+              <a:xfrm>
+                <a:off x="1898247" y="2337855"/>
+                <a:ext cx="1109469" cy="307777"/>
+              </a:xfrm>
+              <a:prstGeom prst="rect">
+                <a:avLst/>
+              </a:prstGeom>
+              <a:noFill/>
+            </p:spPr>
+            <p:txBody>
+              <a:bodyPr wrap="square" rtlCol="0">
+                <a:spAutoFit/>
+              </a:bodyPr>
+              <a:lstStyle/>
+              <a:p>
+                <a:r>
+                  <a:rPr lang="en-US" altLang="ja-JP" sz="1400" dirty="0" smtClean="0">
+                    <a:latin typeface="Helvetica Neue" charset="0"/>
+                    <a:ea typeface="Helvetica Neue" charset="0"/>
+                    <a:cs typeface="Helvetica Neue" charset="0"/>
+                  </a:rPr>
+                  <a:t>OCO-</a:t>
+                </a:r>
+                <a:r>
+                  <a:rPr lang="en-US" altLang="ja-JP" sz="1400" b="1" dirty="0" smtClean="0">
+                    <a:latin typeface="Helvetica Neue" charset="0"/>
+                    <a:ea typeface="Helvetica Neue" charset="0"/>
+                    <a:cs typeface="Helvetica Neue" charset="0"/>
+                  </a:rPr>
+                  <a:t>R1</a:t>
+                </a:r>
+                <a:endParaRPr lang="ja-JP" altLang="en-US" sz="1400" b="1" dirty="0">
+                  <a:latin typeface="Helvetica Neue" charset="0"/>
+                  <a:ea typeface="Helvetica Neue" charset="0"/>
+                  <a:cs typeface="Helvetica Neue" charset="0"/>
+                </a:endParaRPr>
+              </a:p>
+            </p:txBody>
+          </p:sp>
+          <p:sp>
+            <p:nvSpPr>
+              <p:cNvPr id="30" name="テキスト ボックス 29"/>
+              <p:cNvSpPr txBox="1"/>
+              <p:nvPr/>
+            </p:nvSpPr>
+            <p:spPr>
+              <a:xfrm>
+                <a:off x="783106" y="2593232"/>
+                <a:ext cx="908356" cy="307777"/>
+              </a:xfrm>
+              <a:prstGeom prst="rect">
+                <a:avLst/>
+              </a:prstGeom>
+              <a:noFill/>
+            </p:spPr>
+            <p:txBody>
+              <a:bodyPr wrap="square" rtlCol="0">
+                <a:spAutoFit/>
+              </a:bodyPr>
+              <a:lstStyle/>
+              <a:p>
+                <a:pPr algn="r"/>
+                <a:r>
+                  <a:rPr lang="en-US" altLang="ja-JP" sz="1400" b="1" dirty="0" smtClean="0">
+                    <a:latin typeface="Helvetica Neue" charset="0"/>
+                    <a:ea typeface="Helvetica Neue" charset="0"/>
+                    <a:cs typeface="Helvetica Neue" charset="0"/>
+                  </a:rPr>
+                  <a:t>R2</a:t>
+                </a:r>
+                <a:r>
+                  <a:rPr lang="en-US" altLang="ja-JP" sz="1400" dirty="0" smtClean="0">
+                    <a:latin typeface="Helvetica Neue" charset="0"/>
+                    <a:ea typeface="Helvetica Neue" charset="0"/>
+                    <a:cs typeface="Helvetica Neue" charset="0"/>
+                  </a:rPr>
+                  <a:t>-COO</a:t>
+                </a:r>
+                <a:endParaRPr lang="ja-JP" altLang="en-US" sz="1400" dirty="0">
+                  <a:latin typeface="Helvetica Neue" charset="0"/>
+                  <a:ea typeface="Helvetica Neue" charset="0"/>
+                  <a:cs typeface="Helvetica Neue" charset="0"/>
+                </a:endParaRPr>
+              </a:p>
+            </p:txBody>
+          </p:sp>
+          <p:sp>
+            <p:nvSpPr>
+              <p:cNvPr id="31" name="テキスト ボックス 30"/>
+              <p:cNvSpPr txBox="1"/>
+              <p:nvPr/>
+            </p:nvSpPr>
+            <p:spPr>
+              <a:xfrm>
+                <a:off x="1895649" y="2849456"/>
+                <a:ext cx="949358" cy="307777"/>
+              </a:xfrm>
+              <a:prstGeom prst="rect">
+                <a:avLst/>
+              </a:prstGeom>
+              <a:noFill/>
+            </p:spPr>
+            <p:txBody>
+              <a:bodyPr wrap="square" rtlCol="0">
+                <a:spAutoFit/>
+              </a:bodyPr>
+              <a:lstStyle/>
+              <a:p>
+                <a:r>
+                  <a:rPr lang="en-US" altLang="ja-JP" sz="1400" smtClean="0">
+                    <a:latin typeface="Helvetica Neue" charset="0"/>
+                    <a:ea typeface="Helvetica Neue" charset="0"/>
+                    <a:cs typeface="Helvetica Neue" charset="0"/>
+                  </a:rPr>
+                  <a:t>O-PO</a:t>
+                </a:r>
+                <a:r>
+                  <a:rPr lang="en-US" altLang="ja-JP" sz="1100" smtClean="0">
+                    <a:latin typeface="Helvetica Neue" charset="0"/>
+                    <a:ea typeface="Helvetica Neue" charset="0"/>
+                    <a:cs typeface="Helvetica Neue" charset="0"/>
+                  </a:rPr>
+                  <a:t>2</a:t>
+                </a:r>
+                <a:r>
+                  <a:rPr lang="en-US" altLang="ja-JP" sz="1400" smtClean="0">
+                    <a:latin typeface="Helvetica Neue" charset="0"/>
+                    <a:ea typeface="Helvetica Neue" charset="0"/>
+                    <a:cs typeface="Helvetica Neue" charset="0"/>
+                  </a:rPr>
+                  <a:t>-O</a:t>
+                </a:r>
+                <a:endParaRPr lang="en-US" altLang="ja-JP" sz="1400" dirty="0" smtClean="0">
+                  <a:latin typeface="Helvetica Neue" charset="0"/>
+                  <a:ea typeface="Helvetica Neue" charset="0"/>
+                  <a:cs typeface="Helvetica Neue" charset="0"/>
+                </a:endParaRPr>
+              </a:p>
+            </p:txBody>
+          </p:sp>
+          <p:cxnSp>
+            <p:nvCxnSpPr>
+              <p:cNvPr id="32" name="直線コネクタ 31"/>
+              <p:cNvCxnSpPr/>
+              <p:nvPr/>
+            </p:nvCxnSpPr>
+            <p:spPr>
+              <a:xfrm>
+                <a:off x="1794076" y="2498279"/>
+                <a:ext cx="0" cy="540000"/>
+              </a:xfrm>
+              <a:prstGeom prst="line">
+                <a:avLst/>
+              </a:prstGeom>
+              <a:ln w="28575">
+                <a:solidFill>
+                  <a:schemeClr val="tx1"/>
+                </a:solidFill>
+              </a:ln>
+            </p:spPr>
+            <p:style>
+              <a:lnRef idx="1">
+                <a:schemeClr val="accent1"/>
+              </a:lnRef>
+              <a:fillRef idx="0">
+                <a:schemeClr val="accent1"/>
+              </a:fillRef>
+              <a:effectRef idx="0">
+                <a:schemeClr val="accent1"/>
+              </a:effectRef>
+              <a:fontRef idx="minor">
+                <a:schemeClr val="tx1"/>
+              </a:fontRef>
+            </p:style>
+          </p:cxnSp>
+          <p:cxnSp>
+            <p:nvCxnSpPr>
+              <p:cNvPr id="33" name="直線コネクタ 32"/>
+              <p:cNvCxnSpPr/>
+              <p:nvPr/>
+            </p:nvCxnSpPr>
+            <p:spPr>
+              <a:xfrm rot="16200000">
+                <a:off x="1884075" y="2413302"/>
+                <a:ext cx="0" cy="180000"/>
+              </a:xfrm>
+              <a:prstGeom prst="line">
+                <a:avLst/>
+              </a:prstGeom>
+              <a:ln w="28575">
+                <a:solidFill>
+                  <a:schemeClr val="tx1"/>
+                </a:solidFill>
+              </a:ln>
+            </p:spPr>
+            <p:style>
+              <a:lnRef idx="1">
+                <a:schemeClr val="accent1"/>
+              </a:lnRef>
+              <a:fillRef idx="0">
+                <a:schemeClr val="accent1"/>
+              </a:fillRef>
+              <a:effectRef idx="0">
+                <a:schemeClr val="accent1"/>
+              </a:effectRef>
+              <a:fontRef idx="minor">
+                <a:schemeClr val="tx1"/>
+              </a:fontRef>
+            </p:style>
+          </p:cxnSp>
+          <p:cxnSp>
+            <p:nvCxnSpPr>
+              <p:cNvPr id="34" name="直線コネクタ 33"/>
+              <p:cNvCxnSpPr/>
+              <p:nvPr/>
+            </p:nvCxnSpPr>
+            <p:spPr>
+              <a:xfrm rot="16200000">
+                <a:off x="1884075" y="2935579"/>
+                <a:ext cx="0" cy="180000"/>
+              </a:xfrm>
+              <a:prstGeom prst="line">
+                <a:avLst/>
+              </a:prstGeom>
+              <a:ln w="28575">
+                <a:solidFill>
+                  <a:schemeClr val="tx1"/>
+                </a:solidFill>
+              </a:ln>
+            </p:spPr>
+            <p:style>
+              <a:lnRef idx="1">
+                <a:schemeClr val="accent1"/>
+              </a:lnRef>
+              <a:fillRef idx="0">
+                <a:schemeClr val="accent1"/>
+              </a:fillRef>
+              <a:effectRef idx="0">
+                <a:schemeClr val="accent1"/>
+              </a:effectRef>
+              <a:fontRef idx="minor">
+                <a:schemeClr val="tx1"/>
+              </a:fontRef>
+            </p:style>
+          </p:cxnSp>
+          <p:cxnSp>
+            <p:nvCxnSpPr>
+              <p:cNvPr id="35" name="直線コネクタ 34"/>
+              <p:cNvCxnSpPr/>
+              <p:nvPr/>
+            </p:nvCxnSpPr>
+            <p:spPr>
+              <a:xfrm rot="16200000">
+                <a:off x="1704074" y="2686497"/>
+                <a:ext cx="0" cy="180000"/>
+              </a:xfrm>
+              <a:prstGeom prst="line">
+                <a:avLst/>
+              </a:prstGeom>
+              <a:ln w="28575">
+                <a:solidFill>
+                  <a:schemeClr val="tx1"/>
+                </a:solidFill>
+              </a:ln>
+            </p:spPr>
+            <p:style>
+              <a:lnRef idx="1">
+                <a:schemeClr val="accent1"/>
+              </a:lnRef>
+              <a:fillRef idx="0">
+                <a:schemeClr val="accent1"/>
+              </a:fillRef>
+              <a:effectRef idx="0">
+                <a:schemeClr val="accent1"/>
+              </a:effectRef>
+              <a:fontRef idx="minor">
+                <a:schemeClr val="tx1"/>
+              </a:fontRef>
+            </p:style>
+          </p:cxnSp>
+        </p:grpSp>
+        <p:sp>
+          <p:nvSpPr>
+            <p:cNvPr id="37" name="テキスト ボックス 36"/>
+            <p:cNvSpPr txBox="1"/>
+            <p:nvPr/>
+          </p:nvSpPr>
+          <p:spPr>
+            <a:xfrm>
+              <a:off x="3542014" y="3500087"/>
+              <a:ext cx="462169" cy="307777"/>
+            </a:xfrm>
+            <a:prstGeom prst="rect">
+              <a:avLst/>
+            </a:prstGeom>
+            <a:noFill/>
+          </p:spPr>
+          <p:txBody>
+            <a:bodyPr wrap="square" rtlCol="0">
+              <a:spAutoFit/>
+            </a:bodyPr>
+            <a:lstStyle/>
+            <a:p>
+              <a:r>
+                <a:rPr lang="en-US" altLang="ja-JP" sz="1400" dirty="0" smtClean="0">
+                  <a:latin typeface="Helvetica Neue" charset="0"/>
+                  <a:ea typeface="Helvetica Neue" charset="0"/>
+                  <a:cs typeface="Helvetica Neue" charset="0"/>
+                </a:rPr>
+                <a:t>OH</a:t>
+              </a:r>
+              <a:endParaRPr lang="ja-JP" altLang="en-US" sz="1400" dirty="0">
+                <a:latin typeface="Helvetica Neue" charset="0"/>
+                <a:ea typeface="Helvetica Neue" charset="0"/>
+                <a:cs typeface="Helvetica Neue" charset="0"/>
+              </a:endParaRPr>
+            </a:p>
+          </p:txBody>
+        </p:sp>
+        <p:sp>
+          <p:nvSpPr>
+            <p:cNvPr id="38" name="テキスト ボックス 37"/>
+            <p:cNvSpPr txBox="1"/>
+            <p:nvPr/>
+          </p:nvSpPr>
+          <p:spPr>
+            <a:xfrm>
+              <a:off x="2871393" y="3728614"/>
+              <a:ext cx="625033" cy="307777"/>
+            </a:xfrm>
+            <a:prstGeom prst="rect">
+              <a:avLst/>
+            </a:prstGeom>
+            <a:noFill/>
+          </p:spPr>
+          <p:txBody>
+            <a:bodyPr wrap="square" rtlCol="0">
+              <a:spAutoFit/>
+            </a:bodyPr>
+            <a:lstStyle/>
+            <a:p>
+              <a:r>
+                <a:rPr lang="en-US" altLang="ja-JP" sz="1400" dirty="0" smtClean="0">
+                  <a:latin typeface="Helvetica Neue" charset="0"/>
+                  <a:ea typeface="Helvetica Neue" charset="0"/>
+                  <a:cs typeface="Helvetica Neue" charset="0"/>
+                </a:rPr>
+                <a:t>HO</a:t>
+              </a:r>
+              <a:endParaRPr lang="ja-JP" altLang="en-US" sz="1400" dirty="0">
+                <a:latin typeface="Helvetica Neue" charset="0"/>
+                <a:ea typeface="Helvetica Neue" charset="0"/>
+                <a:cs typeface="Helvetica Neue" charset="0"/>
+              </a:endParaRPr>
+            </a:p>
+          </p:txBody>
+        </p:sp>
+        <p:cxnSp>
+          <p:nvCxnSpPr>
+            <p:cNvPr id="40" name="直線コネクタ 39"/>
+            <p:cNvCxnSpPr/>
+            <p:nvPr/>
+          </p:nvCxnSpPr>
+          <p:spPr>
+            <a:xfrm>
+              <a:off x="3384857" y="3348643"/>
+              <a:ext cx="0" cy="540000"/>
+            </a:xfrm>
+            <a:prstGeom prst="line">
+              <a:avLst/>
+            </a:prstGeom>
+            <a:ln w="28575">
+              <a:solidFill>
+                <a:schemeClr val="tx1"/>
+              </a:solidFill>
+            </a:ln>
+          </p:spPr>
+          <p:style>
+            <a:lnRef idx="1">
+              <a:schemeClr val="accent1"/>
+            </a:lnRef>
+            <a:fillRef idx="0">
+              <a:schemeClr val="accent1"/>
+            </a:fillRef>
+            <a:effectRef idx="0">
+              <a:schemeClr val="accent1"/>
+            </a:effectRef>
+            <a:fontRef idx="minor">
+              <a:schemeClr val="tx1"/>
+            </a:fontRef>
+          </p:style>
+        </p:cxnSp>
+        <p:cxnSp>
+          <p:nvCxnSpPr>
+            <p:cNvPr id="41" name="直線コネクタ 40"/>
+            <p:cNvCxnSpPr/>
+            <p:nvPr/>
+          </p:nvCxnSpPr>
+          <p:spPr>
+            <a:xfrm rot="16200000">
+              <a:off x="3316426" y="3258644"/>
+              <a:ext cx="0" cy="180000"/>
+            </a:xfrm>
+            <a:prstGeom prst="line">
+              <a:avLst/>
+            </a:prstGeom>
+            <a:ln w="28575">
+              <a:solidFill>
+                <a:schemeClr val="tx1"/>
+              </a:solidFill>
+            </a:ln>
+          </p:spPr>
+          <p:style>
+            <a:lnRef idx="1">
+              <a:schemeClr val="accent1"/>
+            </a:lnRef>
+            <a:fillRef idx="0">
+              <a:schemeClr val="accent1"/>
+            </a:fillRef>
+            <a:effectRef idx="0">
+              <a:schemeClr val="accent1"/>
+            </a:effectRef>
+            <a:fontRef idx="minor">
+              <a:schemeClr val="tx1"/>
+            </a:fontRef>
+          </p:style>
+        </p:cxnSp>
+        <p:cxnSp>
+          <p:nvCxnSpPr>
+            <p:cNvPr id="42" name="直線コネクタ 41"/>
+            <p:cNvCxnSpPr/>
+            <p:nvPr/>
+          </p:nvCxnSpPr>
+          <p:spPr>
+            <a:xfrm rot="16200000">
+              <a:off x="3316426" y="3798643"/>
+              <a:ext cx="0" cy="180000"/>
+            </a:xfrm>
+            <a:prstGeom prst="line">
+              <a:avLst/>
+            </a:prstGeom>
+            <a:ln w="28575">
+              <a:solidFill>
+                <a:schemeClr val="tx1"/>
+              </a:solidFill>
+            </a:ln>
+          </p:spPr>
+          <p:style>
+            <a:lnRef idx="1">
+              <a:schemeClr val="accent1"/>
+            </a:lnRef>
+            <a:fillRef idx="0">
+              <a:schemeClr val="accent1"/>
+            </a:fillRef>
+            <a:effectRef idx="0">
+              <a:schemeClr val="accent1"/>
+            </a:effectRef>
+            <a:fontRef idx="minor">
+              <a:schemeClr val="tx1"/>
+            </a:fontRef>
+          </p:style>
+        </p:cxnSp>
+        <p:cxnSp>
+          <p:nvCxnSpPr>
+            <p:cNvPr id="43" name="直線コネクタ 42"/>
+            <p:cNvCxnSpPr/>
+            <p:nvPr/>
+          </p:nvCxnSpPr>
+          <p:spPr>
+            <a:xfrm rot="16200000">
+              <a:off x="3496426" y="3579248"/>
+              <a:ext cx="0" cy="180000"/>
+            </a:xfrm>
+            <a:prstGeom prst="line">
+              <a:avLst/>
+            </a:prstGeom>
+            <a:ln w="28575">
+              <a:solidFill>
+                <a:schemeClr val="tx1"/>
+              </a:solidFill>
+            </a:ln>
+          </p:spPr>
+          <p:style>
+            <a:lnRef idx="1">
+              <a:schemeClr val="accent1"/>
+            </a:lnRef>
+            <a:fillRef idx="0">
+              <a:schemeClr val="accent1"/>
+            </a:fillRef>
+            <a:effectRef idx="0">
+              <a:schemeClr val="accent1"/>
+            </a:effectRef>
+            <a:fontRef idx="minor">
+              <a:schemeClr val="tx1"/>
+            </a:fontRef>
+          </p:style>
+        </p:cxnSp>
+      </p:grpSp>
+      <p:grpSp>
+        <p:nvGrpSpPr>
+          <p:cNvPr id="36" name="図形グループ 35"/>
+          <p:cNvGrpSpPr/>
+          <p:nvPr/>
+        </p:nvGrpSpPr>
+        <p:grpSpPr>
+          <a:xfrm>
+            <a:off x="1542870" y="4381326"/>
+            <a:ext cx="145017" cy="436239"/>
+            <a:chOff x="1776569" y="2498279"/>
+            <a:chExt cx="184028" cy="436239"/>
+          </a:xfrm>
+        </p:grpSpPr>
+        <p:cxnSp>
+          <p:nvCxnSpPr>
+            <p:cNvPr id="47" name="直線コネクタ 46"/>
+            <p:cNvCxnSpPr/>
+            <p:nvPr/>
+          </p:nvCxnSpPr>
+          <p:spPr>
+            <a:xfrm>
+              <a:off x="1794076" y="2498279"/>
+              <a:ext cx="0" cy="436239"/>
+            </a:xfrm>
+            <a:prstGeom prst="line">
+              <a:avLst/>
+            </a:prstGeom>
+            <a:ln w="28575">
+              <a:solidFill>
+                <a:schemeClr val="tx1"/>
+              </a:solidFill>
+            </a:ln>
+          </p:spPr>
+          <p:style>
+            <a:lnRef idx="1">
+              <a:schemeClr val="accent1"/>
+            </a:lnRef>
+            <a:fillRef idx="0">
+              <a:schemeClr val="accent1"/>
+            </a:fillRef>
+            <a:effectRef idx="0">
+              <a:schemeClr val="accent1"/>
+            </a:effectRef>
+            <a:fontRef idx="minor">
+              <a:schemeClr val="tx1"/>
+            </a:fontRef>
+          </p:style>
+        </p:cxnSp>
+        <p:cxnSp>
+          <p:nvCxnSpPr>
+            <p:cNvPr id="48" name="直線コネクタ 47"/>
+            <p:cNvCxnSpPr/>
+            <p:nvPr/>
+          </p:nvCxnSpPr>
+          <p:spPr>
+            <a:xfrm rot="16200000">
+              <a:off x="1870333" y="2420525"/>
+              <a:ext cx="0" cy="180000"/>
+            </a:xfrm>
+            <a:prstGeom prst="line">
+              <a:avLst/>
+            </a:prstGeom>
+            <a:ln w="28575">
+              <a:solidFill>
+                <a:schemeClr val="tx1"/>
+              </a:solidFill>
+            </a:ln>
+          </p:spPr>
+          <p:style>
+            <a:lnRef idx="1">
+              <a:schemeClr val="accent1"/>
+            </a:lnRef>
+            <a:fillRef idx="0">
+              <a:schemeClr val="accent1"/>
+            </a:fillRef>
+            <a:effectRef idx="0">
+              <a:schemeClr val="accent1"/>
+            </a:effectRef>
+            <a:fontRef idx="minor">
+              <a:schemeClr val="tx1"/>
+            </a:fontRef>
+          </p:style>
+        </p:cxnSp>
+        <p:cxnSp>
+          <p:nvCxnSpPr>
+            <p:cNvPr id="49" name="直線コネクタ 48"/>
+            <p:cNvCxnSpPr/>
+            <p:nvPr/>
+          </p:nvCxnSpPr>
+          <p:spPr>
+            <a:xfrm rot="16200000">
+              <a:off x="1866569" y="2629347"/>
+              <a:ext cx="0" cy="180000"/>
+            </a:xfrm>
+            <a:prstGeom prst="line">
+              <a:avLst/>
+            </a:prstGeom>
+            <a:ln w="28575">
+              <a:solidFill>
+                <a:schemeClr val="tx1"/>
+              </a:solidFill>
+            </a:ln>
+          </p:spPr>
+          <p:style>
+            <a:lnRef idx="1">
+              <a:schemeClr val="accent1"/>
+            </a:lnRef>
+            <a:fillRef idx="0">
+              <a:schemeClr val="accent1"/>
+            </a:fillRef>
+            <a:effectRef idx="0">
+              <a:schemeClr val="accent1"/>
+            </a:effectRef>
+            <a:fontRef idx="minor">
+              <a:schemeClr val="tx1"/>
+            </a:fontRef>
+          </p:style>
+        </p:cxnSp>
+        <p:cxnSp>
+          <p:nvCxnSpPr>
+            <p:cNvPr id="50" name="直線コネクタ 49"/>
+            <p:cNvCxnSpPr/>
+            <p:nvPr/>
+          </p:nvCxnSpPr>
+          <p:spPr>
+            <a:xfrm rot="16200000">
+              <a:off x="1870597" y="2834993"/>
+              <a:ext cx="0" cy="180000"/>
+            </a:xfrm>
+            <a:prstGeom prst="line">
+              <a:avLst/>
+            </a:prstGeom>
+            <a:ln w="28575">
+              <a:solidFill>
+                <a:schemeClr val="tx1"/>
+              </a:solidFill>
+            </a:ln>
+          </p:spPr>
+          <p:style>
+            <a:lnRef idx="1">
+              <a:schemeClr val="accent1"/>
+            </a:lnRef>
+            <a:fillRef idx="0">
+              <a:schemeClr val="accent1"/>
+            </a:fillRef>
+            <a:effectRef idx="0">
+              <a:schemeClr val="accent1"/>
+            </a:effectRef>
+            <a:fontRef idx="minor">
+              <a:schemeClr val="tx1"/>
+            </a:fontRef>
+          </p:style>
+        </p:cxnSp>
+      </p:grpSp>
+      <p:grpSp>
+        <p:nvGrpSpPr>
+          <p:cNvPr id="51" name="図形グループ 50"/>
+          <p:cNvGrpSpPr/>
+          <p:nvPr/>
+        </p:nvGrpSpPr>
+        <p:grpSpPr>
+          <a:xfrm rot="10800000">
+            <a:off x="1826490" y="4798515"/>
+            <a:ext cx="145017" cy="436239"/>
+            <a:chOff x="1776569" y="2498279"/>
+            <a:chExt cx="184028" cy="436239"/>
+          </a:xfrm>
+        </p:grpSpPr>
+        <p:cxnSp>
+          <p:nvCxnSpPr>
+            <p:cNvPr id="52" name="直線コネクタ 51"/>
+            <p:cNvCxnSpPr/>
+            <p:nvPr/>
+          </p:nvCxnSpPr>
+          <p:spPr>
+            <a:xfrm>
+              <a:off x="1794076" y="2498279"/>
+              <a:ext cx="0" cy="436239"/>
+            </a:xfrm>
+            <a:prstGeom prst="line">
+              <a:avLst/>
+            </a:prstGeom>
+            <a:ln w="28575">
+              <a:solidFill>
+                <a:schemeClr val="tx1"/>
+              </a:solidFill>
+            </a:ln>
+          </p:spPr>
+          <p:style>
+            <a:lnRef idx="1">
+              <a:schemeClr val="accent1"/>
+            </a:lnRef>
+            <a:fillRef idx="0">
+              <a:schemeClr val="accent1"/>
+            </a:fillRef>
+            <a:effectRef idx="0">
+              <a:schemeClr val="accent1"/>
+            </a:effectRef>
+            <a:fontRef idx="minor">
+              <a:schemeClr val="tx1"/>
+            </a:fontRef>
+          </p:style>
+        </p:cxnSp>
+        <p:cxnSp>
+          <p:nvCxnSpPr>
+            <p:cNvPr id="53" name="直線コネクタ 52"/>
+            <p:cNvCxnSpPr/>
+            <p:nvPr/>
+          </p:nvCxnSpPr>
+          <p:spPr>
+            <a:xfrm rot="16200000">
+              <a:off x="1870333" y="2420525"/>
+              <a:ext cx="0" cy="180000"/>
+            </a:xfrm>
+            <a:prstGeom prst="line">
+              <a:avLst/>
+            </a:prstGeom>
+            <a:ln w="28575">
+              <a:solidFill>
+                <a:schemeClr val="tx1"/>
+              </a:solidFill>
+            </a:ln>
+          </p:spPr>
+          <p:style>
+            <a:lnRef idx="1">
+              <a:schemeClr val="accent1"/>
+            </a:lnRef>
+            <a:fillRef idx="0">
+              <a:schemeClr val="accent1"/>
+            </a:fillRef>
+            <a:effectRef idx="0">
+              <a:schemeClr val="accent1"/>
+            </a:effectRef>
+            <a:fontRef idx="minor">
+              <a:schemeClr val="tx1"/>
+            </a:fontRef>
+          </p:style>
+        </p:cxnSp>
+        <p:cxnSp>
+          <p:nvCxnSpPr>
+            <p:cNvPr id="54" name="直線コネクタ 53"/>
+            <p:cNvCxnSpPr/>
+            <p:nvPr/>
+          </p:nvCxnSpPr>
+          <p:spPr>
+            <a:xfrm rot="16200000">
+              <a:off x="1866569" y="2629347"/>
+              <a:ext cx="0" cy="180000"/>
+            </a:xfrm>
+            <a:prstGeom prst="line">
+              <a:avLst/>
+            </a:prstGeom>
+            <a:ln w="28575">
+              <a:solidFill>
+                <a:schemeClr val="tx1"/>
+              </a:solidFill>
+            </a:ln>
+          </p:spPr>
+          <p:style>
+            <a:lnRef idx="1">
+              <a:schemeClr val="accent1"/>
+            </a:lnRef>
+            <a:fillRef idx="0">
+              <a:schemeClr val="accent1"/>
+            </a:fillRef>
+            <a:effectRef idx="0">
+              <a:schemeClr val="accent1"/>
+            </a:effectRef>
+            <a:fontRef idx="minor">
+              <a:schemeClr val="tx1"/>
+            </a:fontRef>
+          </p:style>
+        </p:cxnSp>
+        <p:cxnSp>
+          <p:nvCxnSpPr>
+            <p:cNvPr id="55" name="直線コネクタ 54"/>
+            <p:cNvCxnSpPr/>
+            <p:nvPr/>
+          </p:nvCxnSpPr>
+          <p:spPr>
+            <a:xfrm rot="16200000">
+              <a:off x="1870597" y="2834993"/>
+              <a:ext cx="0" cy="180000"/>
+            </a:xfrm>
+            <a:prstGeom prst="line">
+              <a:avLst/>
+            </a:prstGeom>
+            <a:ln w="28575">
+              <a:solidFill>
+                <a:schemeClr val="tx1"/>
+              </a:solidFill>
+            </a:ln>
+          </p:spPr>
+          <p:style>
+            <a:lnRef idx="1">
+              <a:schemeClr val="accent1"/>
+            </a:lnRef>
+            <a:fillRef idx="0">
+              <a:schemeClr val="accent1"/>
+            </a:fillRef>
+            <a:effectRef idx="0">
+              <a:schemeClr val="accent1"/>
+            </a:effectRef>
+            <a:fontRef idx="minor">
+              <a:schemeClr val="tx1"/>
+            </a:fontRef>
+          </p:style>
+        </p:cxnSp>
+      </p:grpSp>
+    </p:spTree>
+    <p:extLst>
+      <p:ext uri="{BB962C8B-B14F-4D97-AF65-F5344CB8AC3E}">
+        <p14:creationId xmlns:p14="http://schemas.microsoft.com/office/powerpoint/2010/main" val="347151917"/>
+      </p:ext>
+    </p:extLst>
+  </p:cSld>
+  <p:clrMapOvr>
+    <a:masterClrMapping/>
+  </p:clrMapOvr>
+  <p:timing>
+    <p:tnLst>
+      <p:par>
+        <p:cTn xmlns:p14="http://schemas.microsoft.com/office/powerpoint/2010/main" id="1" dur="indefinite" restart="never" nodeType="tmRoot"/>
+      </p:par>
+    </p:tnLst>
+  </p:timing>
 </p:sld>
 </file>
 
@@ -4668,7 +8400,7 @@
     </a:clrScheme>
     <a:fontScheme name="Office">
       <a:majorFont>
-        <a:latin typeface="Yu Gothic Light" panose="020F0302020204030204"/>
+        <a:latin typeface="Yu Gothic Light"/>
         <a:ea typeface=""/>
         <a:cs typeface=""/>
         <a:font script="Jpan" typeface="Yu Gothic Light"/>
@@ -4703,7 +8435,7 @@
         <a:font script="Geor" typeface="Sylfaen"/>
       </a:majorFont>
       <a:minorFont>
-        <a:latin typeface="Yu Gothic" panose="020F0502020204030204"/>
+        <a:latin typeface="Yu Gothic"/>
         <a:ea typeface=""/>
         <a:cs typeface=""/>
         <a:font script="Jpan" typeface="Yu Gothic"/>
@@ -4880,7 +8612,7 @@
   <a:extraClrSchemeLst/>
   <a:extLst>
     <a:ext uri="{05A4C25C-085E-4340-85A3-A5531E510DB2}">
-      <thm15:themeFamily xmlns:thm15="http://schemas.microsoft.com/office/thememl/2012/main" name="Office Theme" id="{62F939B6-93AF-4DB8-9C6B-D6C7DFDC589F}" vid="{4A3C46E8-61CC-4603-A589-7422A47A8E4A}"/>
+      <thm15:themeFamily xmlns:thm15="http://schemas.microsoft.com/office/thememl/2012/main" xmlns="" name="Office Theme" id="{62F939B6-93AF-4DB8-9C6B-D6C7DFDC589F}" vid="{4A3C46E8-61CC-4603-A589-7422A47A8E4A}"/>
     </a:ext>
   </a:extLst>
 </a:theme>
@@ -4929,7 +8661,7 @@
     </a:clrScheme>
     <a:fontScheme name="Office">
       <a:majorFont>
-        <a:latin typeface="Yu Gothic Light" panose="020F0302020204030204"/>
+        <a:latin typeface="Yu Gothic Light"/>
         <a:ea typeface=""/>
         <a:cs typeface=""/>
         <a:font script="Jpan" typeface="Yu Gothic Light"/>
@@ -4964,7 +8696,7 @@
         <a:font script="Geor" typeface="Sylfaen"/>
       </a:majorFont>
       <a:minorFont>
-        <a:latin typeface="Yu Gothic" panose="020F0502020204030204"/>
+        <a:latin typeface="Yu Gothic"/>
         <a:ea typeface=""/>
         <a:cs typeface=""/>
         <a:font script="Jpan" typeface="Yu Gothic"/>
@@ -5141,7 +8873,7 @@
   <a:extraClrSchemeLst/>
   <a:extLst>
     <a:ext uri="{05A4C25C-085E-4340-85A3-A5531E510DB2}">
-      <thm15:themeFamily xmlns:thm15="http://schemas.microsoft.com/office/thememl/2012/main" name="Office Theme" id="{62F939B6-93AF-4DB8-9C6B-D6C7DFDC589F}" vid="{4A3C46E8-61CC-4603-A589-7422A47A8E4A}"/>
+      <thm15:themeFamily xmlns:thm15="http://schemas.microsoft.com/office/thememl/2012/main" xmlns="" name="Office Theme" id="{62F939B6-93AF-4DB8-9C6B-D6C7DFDC589F}" vid="{4A3C46E8-61CC-4603-A589-7422A47A8E4A}"/>
     </a:ext>
   </a:extLst>
 </a:theme>

</xml_diff>